<commit_message>
change ppt, refactoring code
</commit_message>
<xml_diff>
--- a/Java 8 & TDP.pptx
+++ b/Java 8 & TDP.pptx
@@ -5,7 +5,7 @@
     <p:sldMasterId id="2147483648" r:id="rId1"/>
   </p:sldMasterIdLst>
   <p:notesMasterIdLst>
-    <p:notesMasterId r:id="rId57"/>
+    <p:notesMasterId r:id="rId60"/>
   </p:notesMasterIdLst>
   <p:sldIdLst>
     <p:sldId id="257" r:id="rId2"/>
@@ -61,8 +61,11 @@
     <p:sldId id="334" r:id="rId52"/>
     <p:sldId id="336" r:id="rId53"/>
     <p:sldId id="337" r:id="rId54"/>
-    <p:sldId id="295" r:id="rId55"/>
-    <p:sldId id="298" r:id="rId56"/>
+    <p:sldId id="359" r:id="rId55"/>
+    <p:sldId id="360" r:id="rId56"/>
+    <p:sldId id="361" r:id="rId57"/>
+    <p:sldId id="295" r:id="rId58"/>
+    <p:sldId id="298" r:id="rId59"/>
   </p:sldIdLst>
   <p:sldSz cx="12192000" cy="6858000"/>
   <p:notesSz cx="6858000" cy="9144000"/>
@@ -274,7 +277,7 @@
           <a:p>
             <a:fld id="{A2059664-99B4-4163-A825-53E3BC2F8344}" type="datetimeFigureOut">
               <a:rPr lang="en-IE" smtClean="0"/>
-              <a:t>28/04/2017</a:t>
+              <a:t>02/05/2017</a:t>
             </a:fld>
             <a:endParaRPr lang="en-IE"/>
           </a:p>
@@ -2310,7 +2313,7 @@
           <a:p>
             <a:fld id="{EEABE519-2016-4ED1-83D5-B6E38964F80D}" type="slidenum">
               <a:rPr lang="en-IE" smtClean="0"/>
-              <a:t>54</a:t>
+              <a:t>57</a:t>
             </a:fld>
             <a:endParaRPr lang="en-IE"/>
           </a:p>
@@ -3072,7 +3075,7 @@
           <a:p>
             <a:fld id="{A0490DC6-E618-4EBD-94E7-9E755CAEB9C1}" type="datetimeFigureOut">
               <a:rPr lang="en-IE" smtClean="0"/>
-              <a:t>28/04/2017</a:t>
+              <a:t>02/05/2017</a:t>
             </a:fld>
             <a:endParaRPr lang="en-IE"/>
           </a:p>
@@ -3242,7 +3245,7 @@
           <a:p>
             <a:fld id="{A0490DC6-E618-4EBD-94E7-9E755CAEB9C1}" type="datetimeFigureOut">
               <a:rPr lang="en-IE" smtClean="0"/>
-              <a:t>28/04/2017</a:t>
+              <a:t>02/05/2017</a:t>
             </a:fld>
             <a:endParaRPr lang="en-IE"/>
           </a:p>
@@ -3422,7 +3425,7 @@
           <a:p>
             <a:fld id="{A0490DC6-E618-4EBD-94E7-9E755CAEB9C1}" type="datetimeFigureOut">
               <a:rPr lang="en-IE" smtClean="0"/>
-              <a:t>28/04/2017</a:t>
+              <a:t>02/05/2017</a:t>
             </a:fld>
             <a:endParaRPr lang="en-IE"/>
           </a:p>
@@ -3556,7 +3559,7 @@
           <a:p>
             <a:fld id="{37CB99B7-D747-43A6-A568-D9922FEFD07D}" type="datetime1">
               <a:rPr lang="en-IE" smtClean="0"/>
-              <a:t>28/04/2017</a:t>
+              <a:t>02/05/2017</a:t>
             </a:fld>
             <a:endParaRPr lang="en-IE" dirty="0"/>
           </a:p>
@@ -3855,7 +3858,7 @@
           <a:p>
             <a:fld id="{9C39236A-F0DD-467D-A9D0-F6CA7742131B}" type="datetime1">
               <a:rPr lang="en-IE" smtClean="0"/>
-              <a:t>28/04/2017</a:t>
+              <a:t>02/05/2017</a:t>
             </a:fld>
             <a:endParaRPr lang="en-IE"/>
           </a:p>
@@ -4186,7 +4189,7 @@
           <a:p>
             <a:fld id="{A0490DC6-E618-4EBD-94E7-9E755CAEB9C1}" type="datetimeFigureOut">
               <a:rPr lang="en-IE" smtClean="0"/>
-              <a:t>28/04/2017</a:t>
+              <a:t>02/05/2017</a:t>
             </a:fld>
             <a:endParaRPr lang="en-IE"/>
           </a:p>
@@ -4432,7 +4435,7 @@
           <a:p>
             <a:fld id="{A0490DC6-E618-4EBD-94E7-9E755CAEB9C1}" type="datetimeFigureOut">
               <a:rPr lang="en-IE" smtClean="0"/>
-              <a:t>28/04/2017</a:t>
+              <a:t>02/05/2017</a:t>
             </a:fld>
             <a:endParaRPr lang="en-IE"/>
           </a:p>
@@ -4664,7 +4667,7 @@
           <a:p>
             <a:fld id="{A0490DC6-E618-4EBD-94E7-9E755CAEB9C1}" type="datetimeFigureOut">
               <a:rPr lang="en-IE" smtClean="0"/>
-              <a:t>28/04/2017</a:t>
+              <a:t>02/05/2017</a:t>
             </a:fld>
             <a:endParaRPr lang="en-IE"/>
           </a:p>
@@ -5031,7 +5034,7 @@
           <a:p>
             <a:fld id="{A0490DC6-E618-4EBD-94E7-9E755CAEB9C1}" type="datetimeFigureOut">
               <a:rPr lang="en-IE" smtClean="0"/>
-              <a:t>28/04/2017</a:t>
+              <a:t>02/05/2017</a:t>
             </a:fld>
             <a:endParaRPr lang="en-IE"/>
           </a:p>
@@ -5149,7 +5152,7 @@
           <a:p>
             <a:fld id="{A0490DC6-E618-4EBD-94E7-9E755CAEB9C1}" type="datetimeFigureOut">
               <a:rPr lang="en-IE" smtClean="0"/>
-              <a:t>28/04/2017</a:t>
+              <a:t>02/05/2017</a:t>
             </a:fld>
             <a:endParaRPr lang="en-IE"/>
           </a:p>
@@ -5244,7 +5247,7 @@
           <a:p>
             <a:fld id="{A0490DC6-E618-4EBD-94E7-9E755CAEB9C1}" type="datetimeFigureOut">
               <a:rPr lang="en-IE" smtClean="0"/>
-              <a:t>28/04/2017</a:t>
+              <a:t>02/05/2017</a:t>
             </a:fld>
             <a:endParaRPr lang="en-IE"/>
           </a:p>
@@ -5521,7 +5524,7 @@
           <a:p>
             <a:fld id="{A0490DC6-E618-4EBD-94E7-9E755CAEB9C1}" type="datetimeFigureOut">
               <a:rPr lang="en-IE" smtClean="0"/>
-              <a:t>28/04/2017</a:t>
+              <a:t>02/05/2017</a:t>
             </a:fld>
             <a:endParaRPr lang="en-IE"/>
           </a:p>
@@ -5774,7 +5777,7 @@
           <a:p>
             <a:fld id="{A0490DC6-E618-4EBD-94E7-9E755CAEB9C1}" type="datetimeFigureOut">
               <a:rPr lang="en-IE" smtClean="0"/>
-              <a:t>28/04/2017</a:t>
+              <a:t>02/05/2017</a:t>
             </a:fld>
             <a:endParaRPr lang="en-IE"/>
           </a:p>
@@ -5987,7 +5990,7 @@
           <a:p>
             <a:fld id="{A0490DC6-E618-4EBD-94E7-9E755CAEB9C1}" type="datetimeFigureOut">
               <a:rPr lang="en-IE" smtClean="0"/>
-              <a:t>28/04/2017</a:t>
+              <a:t>02/05/2017</a:t>
             </a:fld>
             <a:endParaRPr lang="en-IE"/>
           </a:p>
@@ -25236,17 +25239,7 @@
                 <a:latin typeface="Courier New" panose="02070309020205020404" pitchFamily="49" charset="0"/>
                 <a:cs typeface="Courier New" panose="02070309020205020404" pitchFamily="49" charset="0"/>
               </a:rPr>
-              <a:t>“Thomas</a:t>
-            </a:r>
-            <a:r>
-              <a:rPr lang="en-US" altLang="en-US" b="1" dirty="0">
-                <a:solidFill>
-                  <a:srgbClr val="008000"/>
-                </a:solidFill>
-                <a:latin typeface="Courier New" panose="02070309020205020404" pitchFamily="49" charset="0"/>
-                <a:cs typeface="Courier New" panose="02070309020205020404" pitchFamily="49" charset="0"/>
-              </a:rPr>
-              <a:t>"</a:t>
+              <a:t>“Thomas"</a:t>
             </a:r>
             <a:r>
               <a:rPr kumimoji="0" lang="en-US" altLang="en-US" sz="1800" b="0" i="0" u="none" strike="noStrike" cap="none" normalizeH="0" baseline="0" dirty="0">
@@ -27058,7 +27051,7 @@
           <a:p>
             <a:r>
               <a:rPr lang="en-IE" dirty="0"/>
-              <a:t>Real Scenario in TDP</a:t>
+              <a:t>Practice 1 in TDP </a:t>
             </a:r>
           </a:p>
         </p:txBody>
@@ -29160,7 +29153,7 @@
       </p:sp>
       <p:sp>
         <p:nvSpPr>
-          <p:cNvPr id="5" name="Text Placeholder 1"/>
+          <p:cNvPr id="6" name="Text Placeholder 1"/>
           <p:cNvSpPr>
             <a:spLocks noGrp="1"/>
           </p:cNvSpPr>
@@ -29170,7 +29163,7 @@
         </p:nvSpPr>
         <p:spPr>
           <a:xfrm>
-            <a:off x="724940" y="784935"/>
+            <a:off x="724940" y="1044572"/>
             <a:ext cx="7998646" cy="472528"/>
           </a:xfrm>
         </p:spPr>
@@ -29180,7 +29173,7 @@
           <a:p>
             <a:r>
               <a:rPr lang="en-IE" dirty="0"/>
-              <a:t>Real Scenario in TDP</a:t>
+              <a:t>Practice 1 in TDP </a:t>
             </a:r>
           </a:p>
         </p:txBody>
@@ -29199,6 +29192,2868 @@
 </file>
 
 <file path=ppt/slides/slide54.xml><?xml version="1.0" encoding="utf-8"?>
+<p:sld xmlns:a="http://schemas.openxmlformats.org/drawingml/2006/main" xmlns:r="http://schemas.openxmlformats.org/officeDocument/2006/relationships" xmlns:p="http://schemas.openxmlformats.org/presentationml/2006/main">
+  <p:cSld>
+    <p:spTree>
+      <p:nvGrpSpPr>
+        <p:cNvPr id="1" name=""/>
+        <p:cNvGrpSpPr/>
+        <p:nvPr/>
+      </p:nvGrpSpPr>
+      <p:grpSpPr>
+        <a:xfrm>
+          <a:off x="0" y="0"/>
+          <a:ext cx="0" cy="0"/>
+          <a:chOff x="0" y="0"/>
+          <a:chExt cx="0" cy="0"/>
+        </a:xfrm>
+      </p:grpSpPr>
+      <p:sp>
+        <p:nvSpPr>
+          <p:cNvPr id="2" name="Text Placeholder 1"/>
+          <p:cNvSpPr>
+            <a:spLocks noGrp="1"/>
+          </p:cNvSpPr>
+          <p:nvPr>
+            <p:ph type="body" sz="quarter" idx="12"/>
+          </p:nvPr>
+        </p:nvSpPr>
+        <p:spPr/>
+        <p:txBody>
+          <a:bodyPr/>
+          <a:lstStyle/>
+          <a:p>
+            <a:r>
+              <a:rPr lang="en-IE" dirty="0"/>
+              <a:t>Practice 2 in TDP </a:t>
+            </a:r>
+          </a:p>
+        </p:txBody>
+      </p:sp>
+      <p:sp>
+        <p:nvSpPr>
+          <p:cNvPr id="4" name="Rectangle 1"/>
+          <p:cNvSpPr>
+            <a:spLocks noChangeArrowheads="1"/>
+          </p:cNvSpPr>
+          <p:nvPr/>
+        </p:nvSpPr>
+        <p:spPr bwMode="auto">
+          <a:xfrm>
+            <a:off x="724940" y="1789357"/>
+            <a:ext cx="10269416" cy="4278094"/>
+          </a:xfrm>
+          <a:prstGeom prst="rect">
+            <a:avLst/>
+          </a:prstGeom>
+          <a:solidFill>
+            <a:srgbClr val="FFFFFF"/>
+          </a:solidFill>
+          <a:ln>
+            <a:noFill/>
+          </a:ln>
+          <a:effectLst/>
+          <a:extLst>
+            <a:ext uri="{91240B29-F687-4F45-9708-019B960494DF}">
+              <a14:hiddenLine xmlns:a14="http://schemas.microsoft.com/office/drawing/2010/main" w="9525">
+                <a:solidFill>
+                  <a:schemeClr val="tx1"/>
+                </a:solidFill>
+                <a:miter lim="800000"/>
+                <a:headEnd/>
+                <a:tailEnd/>
+              </a14:hiddenLine>
+            </a:ext>
+            <a:ext uri="{AF507438-7753-43E0-B8FC-AC1667EBCBE1}">
+              <a14:hiddenEffects xmlns:a14="http://schemas.microsoft.com/office/drawing/2010/main">
+                <a:effectLst>
+                  <a:outerShdw dist="35921" dir="2700000" algn="ctr" rotWithShape="0">
+                    <a:schemeClr val="bg2"/>
+                  </a:outerShdw>
+                </a:effectLst>
+              </a14:hiddenEffects>
+            </a:ext>
+          </a:extLst>
+        </p:spPr>
+        <p:txBody>
+          <a:bodyPr vert="horz" wrap="square" lIns="91440" tIns="45720" rIns="91440" bIns="45720" numCol="1" anchor="ctr" anchorCtr="0" compatLnSpc="1">
+            <a:prstTxWarp prst="textNoShape">
+              <a:avLst/>
+            </a:prstTxWarp>
+            <a:spAutoFit/>
+          </a:bodyPr>
+          <a:lstStyle/>
+          <a:p>
+            <a:pPr marL="0" marR="0" lvl="0" indent="0" algn="l" defTabSz="914400" rtl="0" eaLnBrk="0" fontAlgn="base" latinLnBrk="0" hangingPunct="0">
+              <a:lnSpc>
+                <a:spcPct val="100000"/>
+              </a:lnSpc>
+              <a:spcBef>
+                <a:spcPct val="0"/>
+              </a:spcBef>
+              <a:spcAft>
+                <a:spcPct val="0"/>
+              </a:spcAft>
+              <a:buClrTx/>
+              <a:buSzTx/>
+              <a:buFontTx/>
+              <a:buNone/>
+              <a:tabLst/>
+            </a:pPr>
+            <a:r>
+              <a:rPr kumimoji="0" lang="en-US" altLang="en-US" sz="1600" b="1" i="0" u="none" strike="noStrike" cap="none" normalizeH="0" baseline="0" dirty="0">
+                <a:ln>
+                  <a:noFill/>
+                </a:ln>
+                <a:solidFill>
+                  <a:srgbClr val="000080"/>
+                </a:solidFill>
+                <a:effectLst/>
+                <a:latin typeface="Courier New" panose="02070309020205020404" pitchFamily="49" charset="0"/>
+                <a:cs typeface="Courier New" panose="02070309020205020404" pitchFamily="49" charset="0"/>
+              </a:rPr>
+              <a:t>private static </a:t>
+            </a:r>
+            <a:r>
+              <a:rPr kumimoji="0" lang="en-US" altLang="en-US" sz="1600" b="0" i="0" u="none" strike="noStrike" cap="none" normalizeH="0" baseline="0" dirty="0">
+                <a:ln>
+                  <a:noFill/>
+                </a:ln>
+                <a:solidFill>
+                  <a:srgbClr val="000000"/>
+                </a:solidFill>
+                <a:effectLst/>
+                <a:latin typeface="Courier New" panose="02070309020205020404" pitchFamily="49" charset="0"/>
+                <a:cs typeface="Courier New" panose="02070309020205020404" pitchFamily="49" charset="0"/>
+              </a:rPr>
+              <a:t>List&lt;String&gt;</a:t>
+            </a:r>
+            <a:r>
+              <a:rPr kumimoji="0" lang="en-US" altLang="en-US" sz="1600" b="0" i="0" u="none" strike="noStrike" cap="none" normalizeH="0" dirty="0">
+                <a:ln>
+                  <a:noFill/>
+                </a:ln>
+                <a:solidFill>
+                  <a:srgbClr val="000000"/>
+                </a:solidFill>
+                <a:effectLst/>
+                <a:latin typeface="Courier New" panose="02070309020205020404" pitchFamily="49" charset="0"/>
+                <a:cs typeface="Courier New" panose="02070309020205020404" pitchFamily="49" charset="0"/>
+              </a:rPr>
+              <a:t> </a:t>
+            </a:r>
+            <a:r>
+              <a:rPr kumimoji="0" lang="en-US" altLang="en-US" sz="1600" b="0" i="0" u="none" strike="noStrike" cap="none" normalizeH="0" baseline="0" dirty="0">
+                <a:ln>
+                  <a:noFill/>
+                </a:ln>
+                <a:solidFill>
+                  <a:srgbClr val="000000"/>
+                </a:solidFill>
+                <a:effectLst/>
+                <a:latin typeface="Courier New" panose="02070309020205020404" pitchFamily="49" charset="0"/>
+                <a:cs typeface="Courier New" panose="02070309020205020404" pitchFamily="49" charset="0"/>
+              </a:rPr>
+              <a:t>getAllPolicyCodeWithResComSequence1BeforeJava8(List&lt;Reservation&gt; reservations) </a:t>
+            </a:r>
+          </a:p>
+          <a:p>
+            <a:pPr marL="0" marR="0" lvl="0" indent="0" algn="l" defTabSz="914400" rtl="0" eaLnBrk="0" fontAlgn="base" latinLnBrk="0" hangingPunct="0">
+              <a:lnSpc>
+                <a:spcPct val="100000"/>
+              </a:lnSpc>
+              <a:spcBef>
+                <a:spcPct val="0"/>
+              </a:spcBef>
+              <a:spcAft>
+                <a:spcPct val="0"/>
+              </a:spcAft>
+              <a:buClrTx/>
+              <a:buSzTx/>
+              <a:buFontTx/>
+              <a:buNone/>
+              <a:tabLst/>
+            </a:pPr>
+            <a:r>
+              <a:rPr kumimoji="0" lang="en-US" altLang="en-US" sz="1600" b="0" i="0" u="none" strike="noStrike" cap="none" normalizeH="0" baseline="0" dirty="0">
+                <a:ln>
+                  <a:noFill/>
+                </a:ln>
+                <a:solidFill>
+                  <a:srgbClr val="000000"/>
+                </a:solidFill>
+                <a:effectLst/>
+                <a:latin typeface="Courier New" panose="02070309020205020404" pitchFamily="49" charset="0"/>
+                <a:cs typeface="Courier New" panose="02070309020205020404" pitchFamily="49" charset="0"/>
+              </a:rPr>
+              <a:t>{</a:t>
+            </a:r>
+            <a:br>
+              <a:rPr kumimoji="0" lang="en-US" altLang="en-US" sz="1600" b="0" i="0" u="none" strike="noStrike" cap="none" normalizeH="0" baseline="0" dirty="0">
+                <a:ln>
+                  <a:noFill/>
+                </a:ln>
+                <a:solidFill>
+                  <a:srgbClr val="000000"/>
+                </a:solidFill>
+                <a:effectLst/>
+                <a:latin typeface="Courier New" panose="02070309020205020404" pitchFamily="49" charset="0"/>
+                <a:cs typeface="Courier New" panose="02070309020205020404" pitchFamily="49" charset="0"/>
+              </a:rPr>
+            </a:br>
+            <a:br>
+              <a:rPr kumimoji="0" lang="en-US" altLang="en-US" sz="1600" b="0" i="0" u="none" strike="noStrike" cap="none" normalizeH="0" baseline="0" dirty="0">
+                <a:ln>
+                  <a:noFill/>
+                </a:ln>
+                <a:solidFill>
+                  <a:srgbClr val="000000"/>
+                </a:solidFill>
+                <a:effectLst/>
+                <a:latin typeface="Courier New" panose="02070309020205020404" pitchFamily="49" charset="0"/>
+                <a:cs typeface="Courier New" panose="02070309020205020404" pitchFamily="49" charset="0"/>
+              </a:rPr>
+            </a:br>
+            <a:r>
+              <a:rPr kumimoji="0" lang="en-US" altLang="en-US" sz="1600" b="0" i="0" u="none" strike="noStrike" cap="none" normalizeH="0" baseline="0" dirty="0">
+                <a:ln>
+                  <a:noFill/>
+                </a:ln>
+                <a:solidFill>
+                  <a:srgbClr val="000000"/>
+                </a:solidFill>
+                <a:effectLst/>
+                <a:latin typeface="Courier New" panose="02070309020205020404" pitchFamily="49" charset="0"/>
+                <a:cs typeface="Courier New" panose="02070309020205020404" pitchFamily="49" charset="0"/>
+              </a:rPr>
+              <a:t>    List&lt;String&gt; </a:t>
+            </a:r>
+            <a:r>
+              <a:rPr kumimoji="0" lang="en-US" altLang="en-US" sz="1600" b="0" i="0" u="none" strike="noStrike" cap="none" normalizeH="0" baseline="0" dirty="0" err="1">
+                <a:ln>
+                  <a:noFill/>
+                </a:ln>
+                <a:solidFill>
+                  <a:srgbClr val="000000"/>
+                </a:solidFill>
+                <a:effectLst/>
+                <a:latin typeface="Courier New" panose="02070309020205020404" pitchFamily="49" charset="0"/>
+                <a:cs typeface="Courier New" panose="02070309020205020404" pitchFamily="49" charset="0"/>
+              </a:rPr>
+              <a:t>policyCodes</a:t>
+            </a:r>
+            <a:r>
+              <a:rPr kumimoji="0" lang="en-US" altLang="en-US" sz="1600" b="0" i="0" u="none" strike="noStrike" cap="none" normalizeH="0" baseline="0" dirty="0">
+                <a:ln>
+                  <a:noFill/>
+                </a:ln>
+                <a:solidFill>
+                  <a:srgbClr val="000000"/>
+                </a:solidFill>
+                <a:effectLst/>
+                <a:latin typeface="Courier New" panose="02070309020205020404" pitchFamily="49" charset="0"/>
+                <a:cs typeface="Courier New" panose="02070309020205020404" pitchFamily="49" charset="0"/>
+              </a:rPr>
+              <a:t> = </a:t>
+            </a:r>
+            <a:r>
+              <a:rPr kumimoji="0" lang="en-US" altLang="en-US" sz="1600" b="1" i="0" u="none" strike="noStrike" cap="none" normalizeH="0" baseline="0" dirty="0">
+                <a:ln>
+                  <a:noFill/>
+                </a:ln>
+                <a:solidFill>
+                  <a:srgbClr val="000080"/>
+                </a:solidFill>
+                <a:effectLst/>
+                <a:latin typeface="Courier New" panose="02070309020205020404" pitchFamily="49" charset="0"/>
+                <a:cs typeface="Courier New" panose="02070309020205020404" pitchFamily="49" charset="0"/>
+              </a:rPr>
+              <a:t>new </a:t>
+            </a:r>
+            <a:r>
+              <a:rPr kumimoji="0" lang="en-US" altLang="en-US" sz="1600" b="0" i="0" u="none" strike="noStrike" cap="none" normalizeH="0" baseline="0" dirty="0" err="1">
+                <a:ln>
+                  <a:noFill/>
+                </a:ln>
+                <a:solidFill>
+                  <a:srgbClr val="000000"/>
+                </a:solidFill>
+                <a:effectLst/>
+                <a:latin typeface="Courier New" panose="02070309020205020404" pitchFamily="49" charset="0"/>
+                <a:cs typeface="Courier New" panose="02070309020205020404" pitchFamily="49" charset="0"/>
+              </a:rPr>
+              <a:t>ArrayList</a:t>
+            </a:r>
+            <a:r>
+              <a:rPr kumimoji="0" lang="en-US" altLang="en-US" sz="1600" b="0" i="0" u="none" strike="noStrike" cap="none" normalizeH="0" baseline="0" dirty="0">
+                <a:ln>
+                  <a:noFill/>
+                </a:ln>
+                <a:solidFill>
+                  <a:srgbClr val="000000"/>
+                </a:solidFill>
+                <a:effectLst/>
+                <a:latin typeface="Courier New" panose="02070309020205020404" pitchFamily="49" charset="0"/>
+                <a:cs typeface="Courier New" panose="02070309020205020404" pitchFamily="49" charset="0"/>
+              </a:rPr>
+              <a:t>&lt;&gt;();</a:t>
+            </a:r>
+            <a:br>
+              <a:rPr kumimoji="0" lang="en-US" altLang="en-US" sz="1600" b="0" i="0" u="none" strike="noStrike" cap="none" normalizeH="0" baseline="0" dirty="0">
+                <a:ln>
+                  <a:noFill/>
+                </a:ln>
+                <a:solidFill>
+                  <a:srgbClr val="000000"/>
+                </a:solidFill>
+                <a:effectLst/>
+                <a:latin typeface="Courier New" panose="02070309020205020404" pitchFamily="49" charset="0"/>
+                <a:cs typeface="Courier New" panose="02070309020205020404" pitchFamily="49" charset="0"/>
+              </a:rPr>
+            </a:br>
+            <a:r>
+              <a:rPr kumimoji="0" lang="en-US" altLang="en-US" sz="1600" b="0" i="0" u="none" strike="noStrike" cap="none" normalizeH="0" baseline="0" dirty="0">
+                <a:ln>
+                  <a:noFill/>
+                </a:ln>
+                <a:solidFill>
+                  <a:srgbClr val="000000"/>
+                </a:solidFill>
+                <a:effectLst/>
+                <a:latin typeface="Courier New" panose="02070309020205020404" pitchFamily="49" charset="0"/>
+                <a:cs typeface="Courier New" panose="02070309020205020404" pitchFamily="49" charset="0"/>
+              </a:rPr>
+              <a:t>    </a:t>
+            </a:r>
+            <a:r>
+              <a:rPr kumimoji="0" lang="en-US" altLang="en-US" sz="1600" b="1" i="0" u="none" strike="noStrike" cap="none" normalizeH="0" baseline="0" dirty="0">
+                <a:ln>
+                  <a:noFill/>
+                </a:ln>
+                <a:solidFill>
+                  <a:srgbClr val="000080"/>
+                </a:solidFill>
+                <a:effectLst/>
+                <a:latin typeface="Courier New" panose="02070309020205020404" pitchFamily="49" charset="0"/>
+                <a:cs typeface="Courier New" panose="02070309020205020404" pitchFamily="49" charset="0"/>
+              </a:rPr>
+              <a:t>for</a:t>
+            </a:r>
+            <a:r>
+              <a:rPr kumimoji="0" lang="en-US" altLang="en-US" sz="1600" b="0" i="0" u="none" strike="noStrike" cap="none" normalizeH="0" baseline="0" dirty="0">
+                <a:ln>
+                  <a:noFill/>
+                </a:ln>
+                <a:solidFill>
+                  <a:srgbClr val="000000"/>
+                </a:solidFill>
+                <a:effectLst/>
+                <a:latin typeface="Courier New" panose="02070309020205020404" pitchFamily="49" charset="0"/>
+                <a:cs typeface="Courier New" panose="02070309020205020404" pitchFamily="49" charset="0"/>
+              </a:rPr>
+              <a:t>(Reservation </a:t>
+            </a:r>
+            <a:r>
+              <a:rPr kumimoji="0" lang="en-US" altLang="en-US" sz="1600" b="0" i="0" u="none" strike="noStrike" cap="none" normalizeH="0" baseline="0" dirty="0" err="1">
+                <a:ln>
+                  <a:noFill/>
+                </a:ln>
+                <a:solidFill>
+                  <a:srgbClr val="000000"/>
+                </a:solidFill>
+                <a:effectLst/>
+                <a:latin typeface="Courier New" panose="02070309020205020404" pitchFamily="49" charset="0"/>
+                <a:cs typeface="Courier New" panose="02070309020205020404" pitchFamily="49" charset="0"/>
+              </a:rPr>
+              <a:t>reservation</a:t>
+            </a:r>
+            <a:r>
+              <a:rPr kumimoji="0" lang="en-US" altLang="en-US" sz="1600" b="0" i="0" u="none" strike="noStrike" cap="none" normalizeH="0" baseline="0" dirty="0">
+                <a:ln>
+                  <a:noFill/>
+                </a:ln>
+                <a:solidFill>
+                  <a:srgbClr val="000000"/>
+                </a:solidFill>
+                <a:effectLst/>
+                <a:latin typeface="Courier New" panose="02070309020205020404" pitchFamily="49" charset="0"/>
+                <a:cs typeface="Courier New" panose="02070309020205020404" pitchFamily="49" charset="0"/>
+              </a:rPr>
+              <a:t> : reservations){</a:t>
+            </a:r>
+            <a:br>
+              <a:rPr kumimoji="0" lang="en-US" altLang="en-US" sz="1600" b="0" i="0" u="none" strike="noStrike" cap="none" normalizeH="0" baseline="0" dirty="0">
+                <a:ln>
+                  <a:noFill/>
+                </a:ln>
+                <a:solidFill>
+                  <a:srgbClr val="000000"/>
+                </a:solidFill>
+                <a:effectLst/>
+                <a:latin typeface="Courier New" panose="02070309020205020404" pitchFamily="49" charset="0"/>
+                <a:cs typeface="Courier New" panose="02070309020205020404" pitchFamily="49" charset="0"/>
+              </a:rPr>
+            </a:br>
+            <a:r>
+              <a:rPr kumimoji="0" lang="en-US" altLang="en-US" sz="1600" b="0" i="0" u="none" strike="noStrike" cap="none" normalizeH="0" baseline="0" dirty="0">
+                <a:ln>
+                  <a:noFill/>
+                </a:ln>
+                <a:solidFill>
+                  <a:srgbClr val="000000"/>
+                </a:solidFill>
+                <a:effectLst/>
+                <a:latin typeface="Courier New" panose="02070309020205020404" pitchFamily="49" charset="0"/>
+                <a:cs typeface="Courier New" panose="02070309020205020404" pitchFamily="49" charset="0"/>
+              </a:rPr>
+              <a:t>        </a:t>
+            </a:r>
+            <a:r>
+              <a:rPr kumimoji="0" lang="en-US" altLang="en-US" sz="1600" b="1" i="0" u="none" strike="noStrike" cap="none" normalizeH="0" baseline="0" dirty="0">
+                <a:ln>
+                  <a:noFill/>
+                </a:ln>
+                <a:solidFill>
+                  <a:srgbClr val="000080"/>
+                </a:solidFill>
+                <a:effectLst/>
+                <a:latin typeface="Courier New" panose="02070309020205020404" pitchFamily="49" charset="0"/>
+                <a:cs typeface="Courier New" panose="02070309020205020404" pitchFamily="49" charset="0"/>
+              </a:rPr>
+              <a:t>for</a:t>
+            </a:r>
+            <a:r>
+              <a:rPr kumimoji="0" lang="en-US" altLang="en-US" sz="1600" b="0" i="0" u="none" strike="noStrike" cap="none" normalizeH="0" baseline="0" dirty="0">
+                <a:ln>
+                  <a:noFill/>
+                </a:ln>
+                <a:solidFill>
+                  <a:srgbClr val="000000"/>
+                </a:solidFill>
+                <a:effectLst/>
+                <a:latin typeface="Courier New" panose="02070309020205020404" pitchFamily="49" charset="0"/>
+                <a:cs typeface="Courier New" panose="02070309020205020404" pitchFamily="49" charset="0"/>
+              </a:rPr>
+              <a:t>(</a:t>
+            </a:r>
+            <a:r>
+              <a:rPr kumimoji="0" lang="en-US" altLang="en-US" sz="1600" b="0" i="0" u="none" strike="noStrike" cap="none" normalizeH="0" baseline="0" dirty="0" err="1">
+                <a:ln>
+                  <a:noFill/>
+                </a:ln>
+                <a:solidFill>
+                  <a:srgbClr val="000000"/>
+                </a:solidFill>
+                <a:effectLst/>
+                <a:latin typeface="Courier New" panose="02070309020205020404" pitchFamily="49" charset="0"/>
+                <a:cs typeface="Courier New" panose="02070309020205020404" pitchFamily="49" charset="0"/>
+              </a:rPr>
+              <a:t>ResComponent</a:t>
+            </a:r>
+            <a:r>
+              <a:rPr kumimoji="0" lang="en-US" altLang="en-US" sz="1600" b="0" i="0" u="none" strike="noStrike" cap="none" normalizeH="0" baseline="0" dirty="0">
+                <a:ln>
+                  <a:noFill/>
+                </a:ln>
+                <a:solidFill>
+                  <a:srgbClr val="000000"/>
+                </a:solidFill>
+                <a:effectLst/>
+                <a:latin typeface="Courier New" panose="02070309020205020404" pitchFamily="49" charset="0"/>
+                <a:cs typeface="Courier New" panose="02070309020205020404" pitchFamily="49" charset="0"/>
+              </a:rPr>
+              <a:t> </a:t>
+            </a:r>
+            <a:r>
+              <a:rPr kumimoji="0" lang="en-US" altLang="en-US" sz="1600" b="0" i="0" u="none" strike="noStrike" cap="none" normalizeH="0" baseline="0" dirty="0" err="1">
+                <a:ln>
+                  <a:noFill/>
+                </a:ln>
+                <a:solidFill>
+                  <a:srgbClr val="000000"/>
+                </a:solidFill>
+                <a:effectLst/>
+                <a:latin typeface="Courier New" panose="02070309020205020404" pitchFamily="49" charset="0"/>
+                <a:cs typeface="Courier New" panose="02070309020205020404" pitchFamily="49" charset="0"/>
+              </a:rPr>
+              <a:t>resComponent</a:t>
+            </a:r>
+            <a:r>
+              <a:rPr kumimoji="0" lang="en-US" altLang="en-US" sz="1600" b="0" i="0" u="none" strike="noStrike" cap="none" normalizeH="0" baseline="0" dirty="0">
+                <a:ln>
+                  <a:noFill/>
+                </a:ln>
+                <a:solidFill>
+                  <a:srgbClr val="000000"/>
+                </a:solidFill>
+                <a:effectLst/>
+                <a:latin typeface="Courier New" panose="02070309020205020404" pitchFamily="49" charset="0"/>
+                <a:cs typeface="Courier New" panose="02070309020205020404" pitchFamily="49" charset="0"/>
+              </a:rPr>
+              <a:t> : </a:t>
+            </a:r>
+            <a:r>
+              <a:rPr kumimoji="0" lang="en-US" altLang="en-US" sz="1600" b="0" i="0" u="none" strike="noStrike" cap="none" normalizeH="0" baseline="0" dirty="0" err="1">
+                <a:ln>
+                  <a:noFill/>
+                </a:ln>
+                <a:solidFill>
+                  <a:srgbClr val="000000"/>
+                </a:solidFill>
+                <a:effectLst/>
+                <a:latin typeface="Courier New" panose="02070309020205020404" pitchFamily="49" charset="0"/>
+                <a:cs typeface="Courier New" panose="02070309020205020404" pitchFamily="49" charset="0"/>
+              </a:rPr>
+              <a:t>reservation.getResComponents</a:t>
+            </a:r>
+            <a:r>
+              <a:rPr kumimoji="0" lang="en-US" altLang="en-US" sz="1600" b="0" i="0" u="none" strike="noStrike" cap="none" normalizeH="0" baseline="0" dirty="0">
+                <a:ln>
+                  <a:noFill/>
+                </a:ln>
+                <a:solidFill>
+                  <a:srgbClr val="000000"/>
+                </a:solidFill>
+                <a:effectLst/>
+                <a:latin typeface="Courier New" panose="02070309020205020404" pitchFamily="49" charset="0"/>
+                <a:cs typeface="Courier New" panose="02070309020205020404" pitchFamily="49" charset="0"/>
+              </a:rPr>
+              <a:t>())</a:t>
+            </a:r>
+            <a:br>
+              <a:rPr kumimoji="0" lang="en-US" altLang="en-US" sz="1600" b="0" i="0" u="none" strike="noStrike" cap="none" normalizeH="0" baseline="0" dirty="0">
+                <a:ln>
+                  <a:noFill/>
+                </a:ln>
+                <a:solidFill>
+                  <a:srgbClr val="000000"/>
+                </a:solidFill>
+                <a:effectLst/>
+                <a:latin typeface="Courier New" panose="02070309020205020404" pitchFamily="49" charset="0"/>
+                <a:cs typeface="Courier New" panose="02070309020205020404" pitchFamily="49" charset="0"/>
+              </a:rPr>
+            </a:br>
+            <a:r>
+              <a:rPr kumimoji="0" lang="en-US" altLang="en-US" sz="1600" b="0" i="0" u="none" strike="noStrike" cap="none" normalizeH="0" baseline="0" dirty="0">
+                <a:ln>
+                  <a:noFill/>
+                </a:ln>
+                <a:solidFill>
+                  <a:srgbClr val="000000"/>
+                </a:solidFill>
+                <a:effectLst/>
+                <a:latin typeface="Courier New" panose="02070309020205020404" pitchFamily="49" charset="0"/>
+                <a:cs typeface="Courier New" panose="02070309020205020404" pitchFamily="49" charset="0"/>
+              </a:rPr>
+              <a:t>            </a:t>
+            </a:r>
+            <a:r>
+              <a:rPr kumimoji="0" lang="en-US" altLang="en-US" sz="1600" b="1" i="0" u="none" strike="noStrike" cap="none" normalizeH="0" baseline="0" dirty="0">
+                <a:ln>
+                  <a:noFill/>
+                </a:ln>
+                <a:solidFill>
+                  <a:srgbClr val="000080"/>
+                </a:solidFill>
+                <a:effectLst/>
+                <a:latin typeface="Courier New" panose="02070309020205020404" pitchFamily="49" charset="0"/>
+                <a:cs typeface="Courier New" panose="02070309020205020404" pitchFamily="49" charset="0"/>
+              </a:rPr>
+              <a:t>if </a:t>
+            </a:r>
+            <a:r>
+              <a:rPr kumimoji="0" lang="en-US" altLang="en-US" sz="1600" b="0" i="0" u="none" strike="noStrike" cap="none" normalizeH="0" baseline="0" dirty="0">
+                <a:ln>
+                  <a:noFill/>
+                </a:ln>
+                <a:solidFill>
+                  <a:srgbClr val="000000"/>
+                </a:solidFill>
+                <a:effectLst/>
+                <a:latin typeface="Courier New" panose="02070309020205020404" pitchFamily="49" charset="0"/>
+                <a:cs typeface="Courier New" panose="02070309020205020404" pitchFamily="49" charset="0"/>
+              </a:rPr>
+              <a:t>(</a:t>
+            </a:r>
+            <a:r>
+              <a:rPr kumimoji="0" lang="en-US" altLang="en-US" sz="1600" b="0" i="0" u="none" strike="noStrike" cap="none" normalizeH="0" baseline="0" dirty="0" err="1">
+                <a:ln>
+                  <a:noFill/>
+                </a:ln>
+                <a:solidFill>
+                  <a:srgbClr val="000000"/>
+                </a:solidFill>
+                <a:effectLst/>
+                <a:latin typeface="Courier New" panose="02070309020205020404" pitchFamily="49" charset="0"/>
+                <a:cs typeface="Courier New" panose="02070309020205020404" pitchFamily="49" charset="0"/>
+              </a:rPr>
+              <a:t>resComponent.getSequence</a:t>
+            </a:r>
+            <a:r>
+              <a:rPr kumimoji="0" lang="en-US" altLang="en-US" sz="1600" b="0" i="0" u="none" strike="noStrike" cap="none" normalizeH="0" baseline="0" dirty="0">
+                <a:ln>
+                  <a:noFill/>
+                </a:ln>
+                <a:solidFill>
+                  <a:srgbClr val="000000"/>
+                </a:solidFill>
+                <a:effectLst/>
+                <a:latin typeface="Courier New" panose="02070309020205020404" pitchFamily="49" charset="0"/>
+                <a:cs typeface="Courier New" panose="02070309020205020404" pitchFamily="49" charset="0"/>
+              </a:rPr>
+              <a:t>() == </a:t>
+            </a:r>
+            <a:r>
+              <a:rPr kumimoji="0" lang="en-US" altLang="en-US" sz="1600" b="0" i="0" u="none" strike="noStrike" cap="none" normalizeH="0" baseline="0" dirty="0">
+                <a:ln>
+                  <a:noFill/>
+                </a:ln>
+                <a:solidFill>
+                  <a:srgbClr val="0000FF"/>
+                </a:solidFill>
+                <a:effectLst/>
+                <a:latin typeface="Courier New" panose="02070309020205020404" pitchFamily="49" charset="0"/>
+                <a:cs typeface="Courier New" panose="02070309020205020404" pitchFamily="49" charset="0"/>
+              </a:rPr>
+              <a:t>1</a:t>
+            </a:r>
+            <a:r>
+              <a:rPr kumimoji="0" lang="en-US" altLang="en-US" sz="1600" b="0" i="0" u="none" strike="noStrike" cap="none" normalizeH="0" baseline="0" dirty="0">
+                <a:ln>
+                  <a:noFill/>
+                </a:ln>
+                <a:solidFill>
+                  <a:srgbClr val="000000"/>
+                </a:solidFill>
+                <a:effectLst/>
+                <a:latin typeface="Courier New" panose="02070309020205020404" pitchFamily="49" charset="0"/>
+                <a:cs typeface="Courier New" panose="02070309020205020404" pitchFamily="49" charset="0"/>
+              </a:rPr>
+              <a:t>) {</a:t>
+            </a:r>
+            <a:br>
+              <a:rPr kumimoji="0" lang="en-US" altLang="en-US" sz="1600" b="0" i="0" u="none" strike="noStrike" cap="none" normalizeH="0" baseline="0" dirty="0">
+                <a:ln>
+                  <a:noFill/>
+                </a:ln>
+                <a:solidFill>
+                  <a:srgbClr val="000000"/>
+                </a:solidFill>
+                <a:effectLst/>
+                <a:latin typeface="Courier New" panose="02070309020205020404" pitchFamily="49" charset="0"/>
+                <a:cs typeface="Courier New" panose="02070309020205020404" pitchFamily="49" charset="0"/>
+              </a:rPr>
+            </a:br>
+            <a:r>
+              <a:rPr kumimoji="0" lang="en-US" altLang="en-US" sz="1600" b="0" i="0" u="none" strike="noStrike" cap="none" normalizeH="0" baseline="0" dirty="0">
+                <a:ln>
+                  <a:noFill/>
+                </a:ln>
+                <a:solidFill>
+                  <a:srgbClr val="000000"/>
+                </a:solidFill>
+                <a:effectLst/>
+                <a:latin typeface="Courier New" panose="02070309020205020404" pitchFamily="49" charset="0"/>
+                <a:cs typeface="Courier New" panose="02070309020205020404" pitchFamily="49" charset="0"/>
+              </a:rPr>
+              <a:t>                </a:t>
+            </a:r>
+            <a:r>
+              <a:rPr kumimoji="0" lang="en-US" altLang="en-US" sz="1600" b="1" i="0" u="none" strike="noStrike" cap="none" normalizeH="0" baseline="0" dirty="0">
+                <a:ln>
+                  <a:noFill/>
+                </a:ln>
+                <a:solidFill>
+                  <a:srgbClr val="000080"/>
+                </a:solidFill>
+                <a:effectLst/>
+                <a:latin typeface="Courier New" panose="02070309020205020404" pitchFamily="49" charset="0"/>
+                <a:cs typeface="Courier New" panose="02070309020205020404" pitchFamily="49" charset="0"/>
+              </a:rPr>
+              <a:t>for </a:t>
+            </a:r>
+            <a:r>
+              <a:rPr kumimoji="0" lang="en-US" altLang="en-US" sz="1600" b="0" i="0" u="none" strike="noStrike" cap="none" normalizeH="0" baseline="0" dirty="0">
+                <a:ln>
+                  <a:noFill/>
+                </a:ln>
+                <a:solidFill>
+                  <a:srgbClr val="000000"/>
+                </a:solidFill>
+                <a:effectLst/>
+                <a:latin typeface="Courier New" panose="02070309020205020404" pitchFamily="49" charset="0"/>
+                <a:cs typeface="Courier New" panose="02070309020205020404" pitchFamily="49" charset="0"/>
+              </a:rPr>
+              <a:t>(Policy </a:t>
+            </a:r>
+            <a:r>
+              <a:rPr kumimoji="0" lang="en-US" altLang="en-US" sz="1600" b="0" i="0" u="none" strike="noStrike" cap="none" normalizeH="0" baseline="0" dirty="0" err="1">
+                <a:ln>
+                  <a:noFill/>
+                </a:ln>
+                <a:solidFill>
+                  <a:srgbClr val="000000"/>
+                </a:solidFill>
+                <a:effectLst/>
+                <a:latin typeface="Courier New" panose="02070309020205020404" pitchFamily="49" charset="0"/>
+                <a:cs typeface="Courier New" panose="02070309020205020404" pitchFamily="49" charset="0"/>
+              </a:rPr>
+              <a:t>policy</a:t>
+            </a:r>
+            <a:r>
+              <a:rPr kumimoji="0" lang="en-US" altLang="en-US" sz="1600" b="0" i="0" u="none" strike="noStrike" cap="none" normalizeH="0" baseline="0" dirty="0">
+                <a:ln>
+                  <a:noFill/>
+                </a:ln>
+                <a:solidFill>
+                  <a:srgbClr val="000000"/>
+                </a:solidFill>
+                <a:effectLst/>
+                <a:latin typeface="Courier New" panose="02070309020205020404" pitchFamily="49" charset="0"/>
+                <a:cs typeface="Courier New" panose="02070309020205020404" pitchFamily="49" charset="0"/>
+              </a:rPr>
+              <a:t> : </a:t>
+            </a:r>
+            <a:r>
+              <a:rPr kumimoji="0" lang="en-US" altLang="en-US" sz="1600" b="0" i="0" u="none" strike="noStrike" cap="none" normalizeH="0" baseline="0" dirty="0" err="1">
+                <a:ln>
+                  <a:noFill/>
+                </a:ln>
+                <a:solidFill>
+                  <a:srgbClr val="000000"/>
+                </a:solidFill>
+                <a:effectLst/>
+                <a:latin typeface="Courier New" panose="02070309020205020404" pitchFamily="49" charset="0"/>
+                <a:cs typeface="Courier New" panose="02070309020205020404" pitchFamily="49" charset="0"/>
+              </a:rPr>
+              <a:t>resComponent.getPolicies</a:t>
+            </a:r>
+            <a:r>
+              <a:rPr kumimoji="0" lang="en-US" altLang="en-US" sz="1600" b="0" i="0" u="none" strike="noStrike" cap="none" normalizeH="0" baseline="0" dirty="0">
+                <a:ln>
+                  <a:noFill/>
+                </a:ln>
+                <a:solidFill>
+                  <a:srgbClr val="000000"/>
+                </a:solidFill>
+                <a:effectLst/>
+                <a:latin typeface="Courier New" panose="02070309020205020404" pitchFamily="49" charset="0"/>
+                <a:cs typeface="Courier New" panose="02070309020205020404" pitchFamily="49" charset="0"/>
+              </a:rPr>
+              <a:t>()) {</a:t>
+            </a:r>
+            <a:br>
+              <a:rPr kumimoji="0" lang="en-US" altLang="en-US" sz="1600" b="0" i="0" u="none" strike="noStrike" cap="none" normalizeH="0" baseline="0" dirty="0">
+                <a:ln>
+                  <a:noFill/>
+                </a:ln>
+                <a:solidFill>
+                  <a:srgbClr val="000000"/>
+                </a:solidFill>
+                <a:effectLst/>
+                <a:latin typeface="Courier New" panose="02070309020205020404" pitchFamily="49" charset="0"/>
+                <a:cs typeface="Courier New" panose="02070309020205020404" pitchFamily="49" charset="0"/>
+              </a:rPr>
+            </a:br>
+            <a:r>
+              <a:rPr kumimoji="0" lang="en-US" altLang="en-US" sz="1600" b="0" i="0" u="none" strike="noStrike" cap="none" normalizeH="0" baseline="0" dirty="0">
+                <a:ln>
+                  <a:noFill/>
+                </a:ln>
+                <a:solidFill>
+                  <a:srgbClr val="000000"/>
+                </a:solidFill>
+                <a:effectLst/>
+                <a:latin typeface="Courier New" panose="02070309020205020404" pitchFamily="49" charset="0"/>
+                <a:cs typeface="Courier New" panose="02070309020205020404" pitchFamily="49" charset="0"/>
+              </a:rPr>
+              <a:t>                        </a:t>
+            </a:r>
+            <a:r>
+              <a:rPr kumimoji="0" lang="en-US" altLang="en-US" sz="1600" b="1" i="0" u="none" strike="noStrike" cap="none" normalizeH="0" baseline="0" dirty="0">
+                <a:ln>
+                  <a:noFill/>
+                </a:ln>
+                <a:solidFill>
+                  <a:srgbClr val="000080"/>
+                </a:solidFill>
+                <a:effectLst/>
+                <a:latin typeface="Courier New" panose="02070309020205020404" pitchFamily="49" charset="0"/>
+                <a:cs typeface="Courier New" panose="02070309020205020404" pitchFamily="49" charset="0"/>
+              </a:rPr>
+              <a:t>if</a:t>
+            </a:r>
+            <a:r>
+              <a:rPr kumimoji="0" lang="en-US" altLang="en-US" sz="1600" b="0" i="0" u="none" strike="noStrike" cap="none" normalizeH="0" baseline="0" dirty="0">
+                <a:ln>
+                  <a:noFill/>
+                </a:ln>
+                <a:solidFill>
+                  <a:srgbClr val="000000"/>
+                </a:solidFill>
+                <a:effectLst/>
+                <a:latin typeface="Courier New" panose="02070309020205020404" pitchFamily="49" charset="0"/>
+                <a:cs typeface="Courier New" panose="02070309020205020404" pitchFamily="49" charset="0"/>
+              </a:rPr>
+              <a:t>(</a:t>
+            </a:r>
+            <a:r>
+              <a:rPr kumimoji="0" lang="en-US" altLang="en-US" sz="1600" b="0" i="0" u="none" strike="noStrike" cap="none" normalizeH="0" baseline="0" dirty="0" err="1">
+                <a:ln>
+                  <a:noFill/>
+                </a:ln>
+                <a:solidFill>
+                  <a:srgbClr val="000000"/>
+                </a:solidFill>
+                <a:effectLst/>
+                <a:latin typeface="Courier New" panose="02070309020205020404" pitchFamily="49" charset="0"/>
+                <a:cs typeface="Courier New" panose="02070309020205020404" pitchFamily="49" charset="0"/>
+              </a:rPr>
+              <a:t>policy.getPolicyCode</a:t>
+            </a:r>
+            <a:r>
+              <a:rPr kumimoji="0" lang="en-US" altLang="en-US" sz="1600" b="0" i="0" u="none" strike="noStrike" cap="none" normalizeH="0" baseline="0" dirty="0">
+                <a:ln>
+                  <a:noFill/>
+                </a:ln>
+                <a:solidFill>
+                  <a:srgbClr val="000000"/>
+                </a:solidFill>
+                <a:effectLst/>
+                <a:latin typeface="Courier New" panose="02070309020205020404" pitchFamily="49" charset="0"/>
+                <a:cs typeface="Courier New" panose="02070309020205020404" pitchFamily="49" charset="0"/>
+              </a:rPr>
+              <a:t>() != </a:t>
+            </a:r>
+            <a:r>
+              <a:rPr kumimoji="0" lang="en-US" altLang="en-US" sz="1600" b="1" i="0" u="none" strike="noStrike" cap="none" normalizeH="0" baseline="0" dirty="0">
+                <a:ln>
+                  <a:noFill/>
+                </a:ln>
+                <a:solidFill>
+                  <a:srgbClr val="000080"/>
+                </a:solidFill>
+                <a:effectLst/>
+                <a:latin typeface="Courier New" panose="02070309020205020404" pitchFamily="49" charset="0"/>
+                <a:cs typeface="Courier New" panose="02070309020205020404" pitchFamily="49" charset="0"/>
+              </a:rPr>
+              <a:t>null</a:t>
+            </a:r>
+            <a:r>
+              <a:rPr kumimoji="0" lang="en-US" altLang="en-US" sz="1600" b="0" i="0" u="none" strike="noStrike" cap="none" normalizeH="0" baseline="0" dirty="0">
+                <a:ln>
+                  <a:noFill/>
+                </a:ln>
+                <a:solidFill>
+                  <a:srgbClr val="000000"/>
+                </a:solidFill>
+                <a:effectLst/>
+                <a:latin typeface="Courier New" panose="02070309020205020404" pitchFamily="49" charset="0"/>
+                <a:cs typeface="Courier New" panose="02070309020205020404" pitchFamily="49" charset="0"/>
+              </a:rPr>
+              <a:t>)</a:t>
+            </a:r>
+            <a:br>
+              <a:rPr kumimoji="0" lang="en-US" altLang="en-US" sz="1600" b="0" i="0" u="none" strike="noStrike" cap="none" normalizeH="0" baseline="0" dirty="0">
+                <a:ln>
+                  <a:noFill/>
+                </a:ln>
+                <a:solidFill>
+                  <a:srgbClr val="000000"/>
+                </a:solidFill>
+                <a:effectLst/>
+                <a:latin typeface="Courier New" panose="02070309020205020404" pitchFamily="49" charset="0"/>
+                <a:cs typeface="Courier New" panose="02070309020205020404" pitchFamily="49" charset="0"/>
+              </a:rPr>
+            </a:br>
+            <a:r>
+              <a:rPr kumimoji="0" lang="en-US" altLang="en-US" sz="1600" b="0" i="0" u="none" strike="noStrike" cap="none" normalizeH="0" baseline="0" dirty="0">
+                <a:ln>
+                  <a:noFill/>
+                </a:ln>
+                <a:solidFill>
+                  <a:srgbClr val="000000"/>
+                </a:solidFill>
+                <a:effectLst/>
+                <a:latin typeface="Courier New" panose="02070309020205020404" pitchFamily="49" charset="0"/>
+                <a:cs typeface="Courier New" panose="02070309020205020404" pitchFamily="49" charset="0"/>
+              </a:rPr>
+              <a:t>                            </a:t>
+            </a:r>
+            <a:r>
+              <a:rPr kumimoji="0" lang="en-US" altLang="en-US" sz="1600" b="0" i="0" u="none" strike="noStrike" cap="none" normalizeH="0" baseline="0" dirty="0" err="1">
+                <a:ln>
+                  <a:noFill/>
+                </a:ln>
+                <a:solidFill>
+                  <a:srgbClr val="000000"/>
+                </a:solidFill>
+                <a:effectLst/>
+                <a:latin typeface="Courier New" panose="02070309020205020404" pitchFamily="49" charset="0"/>
+                <a:cs typeface="Courier New" panose="02070309020205020404" pitchFamily="49" charset="0"/>
+              </a:rPr>
+              <a:t>policyCodes.add</a:t>
+            </a:r>
+            <a:r>
+              <a:rPr kumimoji="0" lang="en-US" altLang="en-US" sz="1600" b="0" i="0" u="none" strike="noStrike" cap="none" normalizeH="0" baseline="0" dirty="0">
+                <a:ln>
+                  <a:noFill/>
+                </a:ln>
+                <a:solidFill>
+                  <a:srgbClr val="000000"/>
+                </a:solidFill>
+                <a:effectLst/>
+                <a:latin typeface="Courier New" panose="02070309020205020404" pitchFamily="49" charset="0"/>
+                <a:cs typeface="Courier New" panose="02070309020205020404" pitchFamily="49" charset="0"/>
+              </a:rPr>
+              <a:t>(</a:t>
+            </a:r>
+            <a:r>
+              <a:rPr kumimoji="0" lang="en-US" altLang="en-US" sz="1600" b="0" i="0" u="none" strike="noStrike" cap="none" normalizeH="0" baseline="0" dirty="0" err="1">
+                <a:ln>
+                  <a:noFill/>
+                </a:ln>
+                <a:solidFill>
+                  <a:srgbClr val="000000"/>
+                </a:solidFill>
+                <a:effectLst/>
+                <a:latin typeface="Courier New" panose="02070309020205020404" pitchFamily="49" charset="0"/>
+                <a:cs typeface="Courier New" panose="02070309020205020404" pitchFamily="49" charset="0"/>
+              </a:rPr>
+              <a:t>policy.getPolicyCode</a:t>
+            </a:r>
+            <a:r>
+              <a:rPr kumimoji="0" lang="en-US" altLang="en-US" sz="1600" b="0" i="0" u="none" strike="noStrike" cap="none" normalizeH="0" baseline="0" dirty="0">
+                <a:ln>
+                  <a:noFill/>
+                </a:ln>
+                <a:solidFill>
+                  <a:srgbClr val="000000"/>
+                </a:solidFill>
+                <a:effectLst/>
+                <a:latin typeface="Courier New" panose="02070309020205020404" pitchFamily="49" charset="0"/>
+                <a:cs typeface="Courier New" panose="02070309020205020404" pitchFamily="49" charset="0"/>
+              </a:rPr>
+              <a:t>());</a:t>
+            </a:r>
+            <a:br>
+              <a:rPr kumimoji="0" lang="en-US" altLang="en-US" sz="1600" b="0" i="0" u="none" strike="noStrike" cap="none" normalizeH="0" baseline="0" dirty="0">
+                <a:ln>
+                  <a:noFill/>
+                </a:ln>
+                <a:solidFill>
+                  <a:srgbClr val="000000"/>
+                </a:solidFill>
+                <a:effectLst/>
+                <a:latin typeface="Courier New" panose="02070309020205020404" pitchFamily="49" charset="0"/>
+                <a:cs typeface="Courier New" panose="02070309020205020404" pitchFamily="49" charset="0"/>
+              </a:rPr>
+            </a:br>
+            <a:r>
+              <a:rPr kumimoji="0" lang="en-US" altLang="en-US" sz="1600" b="0" i="0" u="none" strike="noStrike" cap="none" normalizeH="0" baseline="0" dirty="0">
+                <a:ln>
+                  <a:noFill/>
+                </a:ln>
+                <a:solidFill>
+                  <a:srgbClr val="000000"/>
+                </a:solidFill>
+                <a:effectLst/>
+                <a:latin typeface="Courier New" panose="02070309020205020404" pitchFamily="49" charset="0"/>
+                <a:cs typeface="Courier New" panose="02070309020205020404" pitchFamily="49" charset="0"/>
+              </a:rPr>
+              <a:t>                }</a:t>
+            </a:r>
+            <a:br>
+              <a:rPr kumimoji="0" lang="en-US" altLang="en-US" sz="1600" b="0" i="0" u="none" strike="noStrike" cap="none" normalizeH="0" baseline="0" dirty="0">
+                <a:ln>
+                  <a:noFill/>
+                </a:ln>
+                <a:solidFill>
+                  <a:srgbClr val="000000"/>
+                </a:solidFill>
+                <a:effectLst/>
+                <a:latin typeface="Courier New" panose="02070309020205020404" pitchFamily="49" charset="0"/>
+                <a:cs typeface="Courier New" panose="02070309020205020404" pitchFamily="49" charset="0"/>
+              </a:rPr>
+            </a:br>
+            <a:r>
+              <a:rPr kumimoji="0" lang="en-US" altLang="en-US" sz="1600" b="0" i="0" u="none" strike="noStrike" cap="none" normalizeH="0" baseline="0" dirty="0">
+                <a:ln>
+                  <a:noFill/>
+                </a:ln>
+                <a:solidFill>
+                  <a:srgbClr val="000000"/>
+                </a:solidFill>
+                <a:effectLst/>
+                <a:latin typeface="Courier New" panose="02070309020205020404" pitchFamily="49" charset="0"/>
+                <a:cs typeface="Courier New" panose="02070309020205020404" pitchFamily="49" charset="0"/>
+              </a:rPr>
+              <a:t>            }</a:t>
+            </a:r>
+            <a:br>
+              <a:rPr kumimoji="0" lang="en-US" altLang="en-US" sz="1600" b="0" i="0" u="none" strike="noStrike" cap="none" normalizeH="0" baseline="0" dirty="0">
+                <a:ln>
+                  <a:noFill/>
+                </a:ln>
+                <a:solidFill>
+                  <a:srgbClr val="000000"/>
+                </a:solidFill>
+                <a:effectLst/>
+                <a:latin typeface="Courier New" panose="02070309020205020404" pitchFamily="49" charset="0"/>
+                <a:cs typeface="Courier New" panose="02070309020205020404" pitchFamily="49" charset="0"/>
+              </a:rPr>
+            </a:br>
+            <a:r>
+              <a:rPr kumimoji="0" lang="en-US" altLang="en-US" sz="1600" b="0" i="0" u="none" strike="noStrike" cap="none" normalizeH="0" baseline="0" dirty="0">
+                <a:ln>
+                  <a:noFill/>
+                </a:ln>
+                <a:solidFill>
+                  <a:srgbClr val="000000"/>
+                </a:solidFill>
+                <a:effectLst/>
+                <a:latin typeface="Courier New" panose="02070309020205020404" pitchFamily="49" charset="0"/>
+                <a:cs typeface="Courier New" panose="02070309020205020404" pitchFamily="49" charset="0"/>
+              </a:rPr>
+              <a:t>    }</a:t>
+            </a:r>
+            <a:br>
+              <a:rPr kumimoji="0" lang="en-US" altLang="en-US" sz="1600" b="0" i="0" u="none" strike="noStrike" cap="none" normalizeH="0" baseline="0" dirty="0">
+                <a:ln>
+                  <a:noFill/>
+                </a:ln>
+                <a:solidFill>
+                  <a:srgbClr val="000000"/>
+                </a:solidFill>
+                <a:effectLst/>
+                <a:latin typeface="Courier New" panose="02070309020205020404" pitchFamily="49" charset="0"/>
+                <a:cs typeface="Courier New" panose="02070309020205020404" pitchFamily="49" charset="0"/>
+              </a:rPr>
+            </a:br>
+            <a:r>
+              <a:rPr kumimoji="0" lang="en-US" altLang="en-US" sz="1600" b="0" i="0" u="none" strike="noStrike" cap="none" normalizeH="0" baseline="0" dirty="0">
+                <a:ln>
+                  <a:noFill/>
+                </a:ln>
+                <a:solidFill>
+                  <a:srgbClr val="000000"/>
+                </a:solidFill>
+                <a:effectLst/>
+                <a:latin typeface="Courier New" panose="02070309020205020404" pitchFamily="49" charset="0"/>
+                <a:cs typeface="Courier New" panose="02070309020205020404" pitchFamily="49" charset="0"/>
+              </a:rPr>
+              <a:t>    </a:t>
+            </a:r>
+            <a:r>
+              <a:rPr kumimoji="0" lang="en-US" altLang="en-US" sz="1600" b="1" i="0" u="none" strike="noStrike" cap="none" normalizeH="0" baseline="0" dirty="0">
+                <a:ln>
+                  <a:noFill/>
+                </a:ln>
+                <a:solidFill>
+                  <a:srgbClr val="000080"/>
+                </a:solidFill>
+                <a:effectLst/>
+                <a:latin typeface="Courier New" panose="02070309020205020404" pitchFamily="49" charset="0"/>
+                <a:cs typeface="Courier New" panose="02070309020205020404" pitchFamily="49" charset="0"/>
+              </a:rPr>
+              <a:t>return </a:t>
+            </a:r>
+            <a:r>
+              <a:rPr kumimoji="0" lang="en-US" altLang="en-US" sz="1600" b="0" i="0" u="none" strike="noStrike" cap="none" normalizeH="0" baseline="0" dirty="0" err="1">
+                <a:ln>
+                  <a:noFill/>
+                </a:ln>
+                <a:solidFill>
+                  <a:srgbClr val="000000"/>
+                </a:solidFill>
+                <a:effectLst/>
+                <a:latin typeface="Courier New" panose="02070309020205020404" pitchFamily="49" charset="0"/>
+                <a:cs typeface="Courier New" panose="02070309020205020404" pitchFamily="49" charset="0"/>
+              </a:rPr>
+              <a:t>policyCodes</a:t>
+            </a:r>
+            <a:r>
+              <a:rPr kumimoji="0" lang="en-US" altLang="en-US" sz="1600" b="0" i="0" u="none" strike="noStrike" cap="none" normalizeH="0" baseline="0" dirty="0">
+                <a:ln>
+                  <a:noFill/>
+                </a:ln>
+                <a:solidFill>
+                  <a:srgbClr val="000000"/>
+                </a:solidFill>
+                <a:effectLst/>
+                <a:latin typeface="Courier New" panose="02070309020205020404" pitchFamily="49" charset="0"/>
+                <a:cs typeface="Courier New" panose="02070309020205020404" pitchFamily="49" charset="0"/>
+              </a:rPr>
+              <a:t>;</a:t>
+            </a:r>
+            <a:br>
+              <a:rPr kumimoji="0" lang="en-US" altLang="en-US" sz="1600" b="0" i="0" u="none" strike="noStrike" cap="none" normalizeH="0" baseline="0" dirty="0">
+                <a:ln>
+                  <a:noFill/>
+                </a:ln>
+                <a:solidFill>
+                  <a:srgbClr val="000000"/>
+                </a:solidFill>
+                <a:effectLst/>
+                <a:latin typeface="Courier New" panose="02070309020205020404" pitchFamily="49" charset="0"/>
+                <a:cs typeface="Courier New" panose="02070309020205020404" pitchFamily="49" charset="0"/>
+              </a:rPr>
+            </a:br>
+            <a:r>
+              <a:rPr kumimoji="0" lang="en-US" altLang="en-US" sz="1600" b="0" i="0" u="none" strike="noStrike" cap="none" normalizeH="0" baseline="0" dirty="0">
+                <a:ln>
+                  <a:noFill/>
+                </a:ln>
+                <a:solidFill>
+                  <a:srgbClr val="000000"/>
+                </a:solidFill>
+                <a:effectLst/>
+                <a:latin typeface="Courier New" panose="02070309020205020404" pitchFamily="49" charset="0"/>
+                <a:cs typeface="Courier New" panose="02070309020205020404" pitchFamily="49" charset="0"/>
+              </a:rPr>
+              <a:t>}</a:t>
+            </a:r>
+            <a:br>
+              <a:rPr kumimoji="0" lang="en-US" altLang="en-US" sz="1600" b="0" i="0" u="none" strike="noStrike" cap="none" normalizeH="0" baseline="0" dirty="0">
+                <a:ln>
+                  <a:noFill/>
+                </a:ln>
+                <a:solidFill>
+                  <a:srgbClr val="000000"/>
+                </a:solidFill>
+                <a:effectLst/>
+                <a:latin typeface="Courier New" panose="02070309020205020404" pitchFamily="49" charset="0"/>
+                <a:cs typeface="Courier New" panose="02070309020205020404" pitchFamily="49" charset="0"/>
+              </a:rPr>
+            </a:br>
+            <a:endParaRPr kumimoji="0" lang="en-US" altLang="en-US" sz="1600" b="0" i="0" u="none" strike="noStrike" cap="none" normalizeH="0" baseline="0" dirty="0">
+              <a:ln>
+                <a:noFill/>
+              </a:ln>
+              <a:solidFill>
+                <a:schemeClr val="tx1"/>
+              </a:solidFill>
+              <a:effectLst/>
+              <a:latin typeface="Arial" panose="020B0604020202020204" pitchFamily="34" charset="0"/>
+            </a:endParaRPr>
+          </a:p>
+        </p:txBody>
+      </p:sp>
+    </p:spTree>
+    <p:extLst>
+      <p:ext uri="{BB962C8B-B14F-4D97-AF65-F5344CB8AC3E}">
+        <p14:creationId xmlns:p14="http://schemas.microsoft.com/office/powerpoint/2010/main" val="26307189"/>
+      </p:ext>
+    </p:extLst>
+  </p:cSld>
+  <p:clrMapOvr>
+    <a:masterClrMapping/>
+  </p:clrMapOvr>
+</p:sld>
+</file>
+
+<file path=ppt/slides/slide55.xml><?xml version="1.0" encoding="utf-8"?>
+<p:sld xmlns:a="http://schemas.openxmlformats.org/drawingml/2006/main" xmlns:r="http://schemas.openxmlformats.org/officeDocument/2006/relationships" xmlns:p="http://schemas.openxmlformats.org/presentationml/2006/main">
+  <p:cSld>
+    <p:spTree>
+      <p:nvGrpSpPr>
+        <p:cNvPr id="1" name=""/>
+        <p:cNvGrpSpPr/>
+        <p:nvPr/>
+      </p:nvGrpSpPr>
+      <p:grpSpPr>
+        <a:xfrm>
+          <a:off x="0" y="0"/>
+          <a:ext cx="0" cy="0"/>
+          <a:chOff x="0" y="0"/>
+          <a:chExt cx="0" cy="0"/>
+        </a:xfrm>
+      </p:grpSpPr>
+      <p:sp>
+        <p:nvSpPr>
+          <p:cNvPr id="2" name="Text Placeholder 1"/>
+          <p:cNvSpPr>
+            <a:spLocks noGrp="1"/>
+          </p:cNvSpPr>
+          <p:nvPr>
+            <p:ph type="body" sz="quarter" idx="12"/>
+          </p:nvPr>
+        </p:nvSpPr>
+        <p:spPr>
+          <a:xfrm>
+            <a:off x="724940" y="866074"/>
+            <a:ext cx="7998646" cy="472528"/>
+          </a:xfrm>
+        </p:spPr>
+        <p:txBody>
+          <a:bodyPr/>
+          <a:lstStyle/>
+          <a:p>
+            <a:r>
+              <a:rPr lang="en-IE" dirty="0"/>
+              <a:t>Practice 2 in TDP </a:t>
+            </a:r>
+          </a:p>
+        </p:txBody>
+      </p:sp>
+      <p:sp>
+        <p:nvSpPr>
+          <p:cNvPr id="5" name="Text Placeholder 1"/>
+          <p:cNvSpPr>
+            <a:spLocks noGrp="1"/>
+          </p:cNvSpPr>
+          <p:nvPr>
+            <p:ph type="body" sz="quarter" idx="12"/>
+          </p:nvPr>
+        </p:nvSpPr>
+        <p:spPr>
+          <a:xfrm>
+            <a:off x="724940" y="1693157"/>
+            <a:ext cx="7998646" cy="472528"/>
+          </a:xfrm>
+        </p:spPr>
+        <p:txBody>
+          <a:bodyPr/>
+          <a:lstStyle/>
+          <a:p>
+            <a:r>
+              <a:rPr lang="en-IE" sz="2800" dirty="0"/>
+              <a:t>Improved by using </a:t>
+            </a:r>
+            <a:r>
+              <a:rPr lang="el-GR" sz="2800" b="1" dirty="0"/>
+              <a:t>λ</a:t>
+            </a:r>
+            <a:r>
+              <a:rPr lang="en-IE" sz="2800" dirty="0"/>
+              <a:t>, Stream and Optional</a:t>
+            </a:r>
+          </a:p>
+          <a:p>
+            <a:endParaRPr lang="en-IE" sz="2800" dirty="0"/>
+          </a:p>
+        </p:txBody>
+      </p:sp>
+      <p:sp>
+        <p:nvSpPr>
+          <p:cNvPr id="3" name="Rectangle 1"/>
+          <p:cNvSpPr>
+            <a:spLocks noChangeArrowheads="1"/>
+          </p:cNvSpPr>
+          <p:nvPr/>
+        </p:nvSpPr>
+        <p:spPr bwMode="auto">
+          <a:xfrm>
+            <a:off x="598331" y="2402268"/>
+            <a:ext cx="11021583" cy="3108543"/>
+          </a:xfrm>
+          <a:prstGeom prst="rect">
+            <a:avLst/>
+          </a:prstGeom>
+          <a:solidFill>
+            <a:srgbClr val="FFFFFF"/>
+          </a:solidFill>
+          <a:ln>
+            <a:noFill/>
+          </a:ln>
+          <a:effectLst/>
+          <a:extLst>
+            <a:ext uri="{91240B29-F687-4F45-9708-019B960494DF}">
+              <a14:hiddenLine xmlns:a14="http://schemas.microsoft.com/office/drawing/2010/main" w="9525">
+                <a:solidFill>
+                  <a:schemeClr val="tx1"/>
+                </a:solidFill>
+                <a:miter lim="800000"/>
+                <a:headEnd/>
+                <a:tailEnd/>
+              </a14:hiddenLine>
+            </a:ext>
+            <a:ext uri="{AF507438-7753-43E0-B8FC-AC1667EBCBE1}">
+              <a14:hiddenEffects xmlns:a14="http://schemas.microsoft.com/office/drawing/2010/main">
+                <a:effectLst>
+                  <a:outerShdw dist="35921" dir="2700000" algn="ctr" rotWithShape="0">
+                    <a:schemeClr val="bg2"/>
+                  </a:outerShdw>
+                </a:effectLst>
+              </a14:hiddenEffects>
+            </a:ext>
+          </a:extLst>
+        </p:spPr>
+        <p:txBody>
+          <a:bodyPr vert="horz" wrap="square" lIns="91440" tIns="45720" rIns="91440" bIns="45720" numCol="1" anchor="ctr" anchorCtr="0" compatLnSpc="1">
+            <a:prstTxWarp prst="textNoShape">
+              <a:avLst/>
+            </a:prstTxWarp>
+            <a:spAutoFit/>
+          </a:bodyPr>
+          <a:lstStyle/>
+          <a:p>
+            <a:pPr marL="0" marR="0" lvl="0" indent="0" algn="l" defTabSz="914400" rtl="0" eaLnBrk="0" fontAlgn="base" latinLnBrk="0" hangingPunct="0">
+              <a:lnSpc>
+                <a:spcPct val="100000"/>
+              </a:lnSpc>
+              <a:spcBef>
+                <a:spcPct val="0"/>
+              </a:spcBef>
+              <a:spcAft>
+                <a:spcPct val="0"/>
+              </a:spcAft>
+              <a:buClrTx/>
+              <a:buSzTx/>
+              <a:buFontTx/>
+              <a:buNone/>
+              <a:tabLst/>
+            </a:pPr>
+            <a:r>
+              <a:rPr kumimoji="0" lang="en-US" altLang="en-US" sz="1400" b="1" i="0" u="none" strike="noStrike" cap="none" normalizeH="0" baseline="0" dirty="0">
+                <a:ln>
+                  <a:noFill/>
+                </a:ln>
+                <a:solidFill>
+                  <a:srgbClr val="000080"/>
+                </a:solidFill>
+                <a:effectLst/>
+                <a:latin typeface="Courier New" panose="02070309020205020404" pitchFamily="49" charset="0"/>
+                <a:cs typeface="Courier New" panose="02070309020205020404" pitchFamily="49" charset="0"/>
+              </a:rPr>
+              <a:t>public static </a:t>
+            </a:r>
+            <a:r>
+              <a:rPr kumimoji="0" lang="en-US" altLang="en-US" sz="1400" b="0" i="0" u="none" strike="noStrike" cap="none" normalizeH="0" baseline="0" dirty="0">
+                <a:ln>
+                  <a:noFill/>
+                </a:ln>
+                <a:solidFill>
+                  <a:srgbClr val="000000"/>
+                </a:solidFill>
+                <a:effectLst/>
+                <a:latin typeface="Courier New" panose="02070309020205020404" pitchFamily="49" charset="0"/>
+                <a:cs typeface="Courier New" panose="02070309020205020404" pitchFamily="49" charset="0"/>
+              </a:rPr>
+              <a:t>List&lt;String&gt; getAllPolicyCodeWithResComSequence1InJava8(List&lt;Reservation&gt; reservations) </a:t>
+            </a:r>
+          </a:p>
+          <a:p>
+            <a:pPr marL="0" marR="0" lvl="0" indent="0" algn="l" defTabSz="914400" rtl="0" eaLnBrk="0" fontAlgn="base" latinLnBrk="0" hangingPunct="0">
+              <a:lnSpc>
+                <a:spcPct val="100000"/>
+              </a:lnSpc>
+              <a:spcBef>
+                <a:spcPct val="0"/>
+              </a:spcBef>
+              <a:spcAft>
+                <a:spcPct val="0"/>
+              </a:spcAft>
+              <a:buClrTx/>
+              <a:buSzTx/>
+              <a:buFontTx/>
+              <a:buNone/>
+              <a:tabLst/>
+            </a:pPr>
+            <a:r>
+              <a:rPr lang="en-US" altLang="en-US" sz="1400" dirty="0">
+                <a:solidFill>
+                  <a:srgbClr val="000000"/>
+                </a:solidFill>
+                <a:latin typeface="Courier New" panose="02070309020205020404" pitchFamily="49" charset="0"/>
+                <a:cs typeface="Courier New" panose="02070309020205020404" pitchFamily="49" charset="0"/>
+              </a:rPr>
+              <a:t>  </a:t>
+            </a:r>
+            <a:r>
+              <a:rPr kumimoji="0" lang="en-US" altLang="en-US" sz="1400" b="0" i="0" u="none" strike="noStrike" cap="none" normalizeH="0" baseline="0" dirty="0">
+                <a:ln>
+                  <a:noFill/>
+                </a:ln>
+                <a:solidFill>
+                  <a:srgbClr val="000000"/>
+                </a:solidFill>
+                <a:effectLst/>
+                <a:latin typeface="Courier New" panose="02070309020205020404" pitchFamily="49" charset="0"/>
+                <a:cs typeface="Courier New" panose="02070309020205020404" pitchFamily="49" charset="0"/>
+              </a:rPr>
+              <a:t>{</a:t>
+            </a:r>
+            <a:br>
+              <a:rPr kumimoji="0" lang="en-US" altLang="en-US" sz="1400" b="0" i="0" u="none" strike="noStrike" cap="none" normalizeH="0" baseline="0" dirty="0">
+                <a:ln>
+                  <a:noFill/>
+                </a:ln>
+                <a:solidFill>
+                  <a:srgbClr val="000000"/>
+                </a:solidFill>
+                <a:effectLst/>
+                <a:latin typeface="Courier New" panose="02070309020205020404" pitchFamily="49" charset="0"/>
+                <a:cs typeface="Courier New" panose="02070309020205020404" pitchFamily="49" charset="0"/>
+              </a:rPr>
+            </a:br>
+            <a:br>
+              <a:rPr kumimoji="0" lang="en-US" altLang="en-US" sz="1400" b="0" i="0" u="none" strike="noStrike" cap="none" normalizeH="0" baseline="0" dirty="0">
+                <a:ln>
+                  <a:noFill/>
+                </a:ln>
+                <a:solidFill>
+                  <a:srgbClr val="000000"/>
+                </a:solidFill>
+                <a:effectLst/>
+                <a:latin typeface="Courier New" panose="02070309020205020404" pitchFamily="49" charset="0"/>
+                <a:cs typeface="Courier New" panose="02070309020205020404" pitchFamily="49" charset="0"/>
+              </a:rPr>
+            </a:br>
+            <a:r>
+              <a:rPr kumimoji="0" lang="en-US" altLang="en-US" sz="1400" b="0" i="0" u="none" strike="noStrike" cap="none" normalizeH="0" baseline="0" dirty="0">
+                <a:ln>
+                  <a:noFill/>
+                </a:ln>
+                <a:solidFill>
+                  <a:srgbClr val="000000"/>
+                </a:solidFill>
+                <a:effectLst/>
+                <a:latin typeface="Courier New" panose="02070309020205020404" pitchFamily="49" charset="0"/>
+                <a:cs typeface="Courier New" panose="02070309020205020404" pitchFamily="49" charset="0"/>
+              </a:rPr>
+              <a:t>        </a:t>
+            </a:r>
+            <a:r>
+              <a:rPr kumimoji="0" lang="en-US" altLang="en-US" sz="1400" b="1" i="0" u="none" strike="noStrike" cap="none" normalizeH="0" baseline="0" dirty="0">
+                <a:ln>
+                  <a:noFill/>
+                </a:ln>
+                <a:solidFill>
+                  <a:srgbClr val="000080"/>
+                </a:solidFill>
+                <a:effectLst/>
+                <a:latin typeface="Courier New" panose="02070309020205020404" pitchFamily="49" charset="0"/>
+                <a:cs typeface="Courier New" panose="02070309020205020404" pitchFamily="49" charset="0"/>
+              </a:rPr>
+              <a:t>return </a:t>
+            </a:r>
+            <a:r>
+              <a:rPr kumimoji="0" lang="en-US" altLang="en-US" sz="1400" b="0" i="0" u="none" strike="noStrike" cap="none" normalizeH="0" baseline="0" dirty="0">
+                <a:ln>
+                  <a:noFill/>
+                </a:ln>
+                <a:solidFill>
+                  <a:srgbClr val="000000"/>
+                </a:solidFill>
+                <a:effectLst/>
+                <a:latin typeface="Courier New" panose="02070309020205020404" pitchFamily="49" charset="0"/>
+                <a:cs typeface="Courier New" panose="02070309020205020404" pitchFamily="49" charset="0"/>
+              </a:rPr>
+              <a:t>reservations</a:t>
+            </a:r>
+            <a:br>
+              <a:rPr kumimoji="0" lang="en-US" altLang="en-US" sz="1400" b="0" i="0" u="none" strike="noStrike" cap="none" normalizeH="0" baseline="0" dirty="0">
+                <a:ln>
+                  <a:noFill/>
+                </a:ln>
+                <a:solidFill>
+                  <a:srgbClr val="000000"/>
+                </a:solidFill>
+                <a:effectLst/>
+                <a:latin typeface="Courier New" panose="02070309020205020404" pitchFamily="49" charset="0"/>
+                <a:cs typeface="Courier New" panose="02070309020205020404" pitchFamily="49" charset="0"/>
+              </a:rPr>
+            </a:br>
+            <a:r>
+              <a:rPr kumimoji="0" lang="en-US" altLang="en-US" sz="1400" b="0" i="0" u="none" strike="noStrike" cap="none" normalizeH="0" baseline="0" dirty="0">
+                <a:ln>
+                  <a:noFill/>
+                </a:ln>
+                <a:solidFill>
+                  <a:srgbClr val="000000"/>
+                </a:solidFill>
+                <a:effectLst/>
+                <a:latin typeface="Courier New" panose="02070309020205020404" pitchFamily="49" charset="0"/>
+                <a:cs typeface="Courier New" panose="02070309020205020404" pitchFamily="49" charset="0"/>
+              </a:rPr>
+              <a:t>                    .stream()</a:t>
+            </a:r>
+            <a:br>
+              <a:rPr kumimoji="0" lang="en-US" altLang="en-US" sz="1400" b="0" i="0" u="none" strike="noStrike" cap="none" normalizeH="0" baseline="0" dirty="0">
+                <a:ln>
+                  <a:noFill/>
+                </a:ln>
+                <a:solidFill>
+                  <a:srgbClr val="000000"/>
+                </a:solidFill>
+                <a:effectLst/>
+                <a:latin typeface="Courier New" panose="02070309020205020404" pitchFamily="49" charset="0"/>
+                <a:cs typeface="Courier New" panose="02070309020205020404" pitchFamily="49" charset="0"/>
+              </a:rPr>
+            </a:br>
+            <a:r>
+              <a:rPr kumimoji="0" lang="en-US" altLang="en-US" sz="1400" b="0" i="0" u="none" strike="noStrike" cap="none" normalizeH="0" baseline="0" dirty="0">
+                <a:ln>
+                  <a:noFill/>
+                </a:ln>
+                <a:solidFill>
+                  <a:srgbClr val="000000"/>
+                </a:solidFill>
+                <a:effectLst/>
+                <a:latin typeface="Courier New" panose="02070309020205020404" pitchFamily="49" charset="0"/>
+                <a:cs typeface="Courier New" panose="02070309020205020404" pitchFamily="49" charset="0"/>
+              </a:rPr>
+              <a:t>  </a:t>
+            </a:r>
+            <a:r>
+              <a:rPr kumimoji="0" lang="en-US" altLang="en-US" sz="1400" b="0" i="1" u="none" strike="noStrike" cap="none" normalizeH="0" baseline="0" dirty="0">
+                <a:ln>
+                  <a:noFill/>
+                </a:ln>
+                <a:solidFill>
+                  <a:srgbClr val="808080"/>
+                </a:solidFill>
+                <a:effectLst/>
+                <a:latin typeface="Courier New" panose="02070309020205020404" pitchFamily="49" charset="0"/>
+                <a:cs typeface="Courier New" panose="02070309020205020404" pitchFamily="49" charset="0"/>
+              </a:rPr>
+              <a:t>//                .parallel()</a:t>
+            </a:r>
+            <a:br>
+              <a:rPr kumimoji="0" lang="en-US" altLang="en-US" sz="1400" b="0" i="1" u="none" strike="noStrike" cap="none" normalizeH="0" baseline="0" dirty="0">
+                <a:ln>
+                  <a:noFill/>
+                </a:ln>
+                <a:solidFill>
+                  <a:srgbClr val="808080"/>
+                </a:solidFill>
+                <a:effectLst/>
+                <a:latin typeface="Courier New" panose="02070309020205020404" pitchFamily="49" charset="0"/>
+                <a:cs typeface="Courier New" panose="02070309020205020404" pitchFamily="49" charset="0"/>
+              </a:rPr>
+            </a:br>
+            <a:r>
+              <a:rPr kumimoji="0" lang="en-US" altLang="en-US" sz="1400" b="0" i="1" u="none" strike="noStrike" cap="none" normalizeH="0" baseline="0" dirty="0">
+                <a:ln>
+                  <a:noFill/>
+                </a:ln>
+                <a:solidFill>
+                  <a:srgbClr val="808080"/>
+                </a:solidFill>
+                <a:effectLst/>
+                <a:latin typeface="Courier New" panose="02070309020205020404" pitchFamily="49" charset="0"/>
+                <a:cs typeface="Courier New" panose="02070309020205020404" pitchFamily="49" charset="0"/>
+              </a:rPr>
+              <a:t>                        </a:t>
+            </a:r>
+            <a:r>
+              <a:rPr kumimoji="0" lang="en-US" altLang="en-US" sz="1400" b="0" i="0" u="none" strike="noStrike" cap="none" normalizeH="0" baseline="0" dirty="0">
+                <a:ln>
+                  <a:noFill/>
+                </a:ln>
+                <a:solidFill>
+                  <a:srgbClr val="000000"/>
+                </a:solidFill>
+                <a:effectLst/>
+                <a:latin typeface="Courier New" panose="02070309020205020404" pitchFamily="49" charset="0"/>
+                <a:cs typeface="Courier New" panose="02070309020205020404" pitchFamily="49" charset="0"/>
+              </a:rPr>
+              <a:t>.map(reservation -&gt; </a:t>
+            </a:r>
+            <a:r>
+              <a:rPr kumimoji="0" lang="en-US" altLang="en-US" sz="1400" b="0" i="0" u="none" strike="noStrike" cap="none" normalizeH="0" baseline="0" dirty="0" err="1">
+                <a:ln>
+                  <a:noFill/>
+                </a:ln>
+                <a:solidFill>
+                  <a:srgbClr val="000000"/>
+                </a:solidFill>
+                <a:effectLst/>
+                <a:latin typeface="Courier New" panose="02070309020205020404" pitchFamily="49" charset="0"/>
+                <a:cs typeface="Courier New" panose="02070309020205020404" pitchFamily="49" charset="0"/>
+              </a:rPr>
+              <a:t>reservation.getResComponents</a:t>
+            </a:r>
+            <a:r>
+              <a:rPr kumimoji="0" lang="en-US" altLang="en-US" sz="1400" b="0" i="0" u="none" strike="noStrike" cap="none" normalizeH="0" baseline="0" dirty="0">
+                <a:ln>
+                  <a:noFill/>
+                </a:ln>
+                <a:solidFill>
+                  <a:srgbClr val="000000"/>
+                </a:solidFill>
+                <a:effectLst/>
+                <a:latin typeface="Courier New" panose="02070309020205020404" pitchFamily="49" charset="0"/>
+                <a:cs typeface="Courier New" panose="02070309020205020404" pitchFamily="49" charset="0"/>
+              </a:rPr>
+              <a:t>())</a:t>
+            </a:r>
+            <a:br>
+              <a:rPr kumimoji="0" lang="en-US" altLang="en-US" sz="1400" b="0" i="0" u="none" strike="noStrike" cap="none" normalizeH="0" baseline="0" dirty="0">
+                <a:ln>
+                  <a:noFill/>
+                </a:ln>
+                <a:solidFill>
+                  <a:srgbClr val="000000"/>
+                </a:solidFill>
+                <a:effectLst/>
+                <a:latin typeface="Courier New" panose="02070309020205020404" pitchFamily="49" charset="0"/>
+                <a:cs typeface="Courier New" panose="02070309020205020404" pitchFamily="49" charset="0"/>
+              </a:rPr>
+            </a:br>
+            <a:r>
+              <a:rPr kumimoji="0" lang="en-US" altLang="en-US" sz="1400" b="0" i="0" u="none" strike="noStrike" cap="none" normalizeH="0" baseline="0" dirty="0">
+                <a:ln>
+                  <a:noFill/>
+                </a:ln>
+                <a:solidFill>
+                  <a:srgbClr val="000000"/>
+                </a:solidFill>
+                <a:effectLst/>
+                <a:latin typeface="Courier New" panose="02070309020205020404" pitchFamily="49" charset="0"/>
+                <a:cs typeface="Courier New" panose="02070309020205020404" pitchFamily="49" charset="0"/>
+              </a:rPr>
+              <a:t>                        .</a:t>
+            </a:r>
+            <a:r>
+              <a:rPr kumimoji="0" lang="en-US" altLang="en-US" sz="1400" b="0" i="0" u="none" strike="noStrike" cap="none" normalizeH="0" baseline="0" dirty="0" err="1">
+                <a:ln>
+                  <a:noFill/>
+                </a:ln>
+                <a:solidFill>
+                  <a:srgbClr val="000000"/>
+                </a:solidFill>
+                <a:effectLst/>
+                <a:latin typeface="Courier New" panose="02070309020205020404" pitchFamily="49" charset="0"/>
+                <a:cs typeface="Courier New" panose="02070309020205020404" pitchFamily="49" charset="0"/>
+              </a:rPr>
+              <a:t>flatMap</a:t>
+            </a:r>
+            <a:r>
+              <a:rPr kumimoji="0" lang="en-US" altLang="en-US" sz="1400" b="0" i="0" u="none" strike="noStrike" cap="none" normalizeH="0" baseline="0" dirty="0">
+                <a:ln>
+                  <a:noFill/>
+                </a:ln>
+                <a:solidFill>
+                  <a:srgbClr val="000000"/>
+                </a:solidFill>
+                <a:effectLst/>
+                <a:latin typeface="Courier New" panose="02070309020205020404" pitchFamily="49" charset="0"/>
+                <a:cs typeface="Courier New" panose="02070309020205020404" pitchFamily="49" charset="0"/>
+              </a:rPr>
+              <a:t>(Collection::stream)</a:t>
+            </a:r>
+            <a:br>
+              <a:rPr kumimoji="0" lang="en-US" altLang="en-US" sz="1400" b="0" i="0" u="none" strike="noStrike" cap="none" normalizeH="0" baseline="0" dirty="0">
+                <a:ln>
+                  <a:noFill/>
+                </a:ln>
+                <a:solidFill>
+                  <a:srgbClr val="000000"/>
+                </a:solidFill>
+                <a:effectLst/>
+                <a:latin typeface="Courier New" panose="02070309020205020404" pitchFamily="49" charset="0"/>
+                <a:cs typeface="Courier New" panose="02070309020205020404" pitchFamily="49" charset="0"/>
+              </a:rPr>
+            </a:br>
+            <a:r>
+              <a:rPr kumimoji="0" lang="en-US" altLang="en-US" sz="1400" b="0" i="0" u="none" strike="noStrike" cap="none" normalizeH="0" baseline="0" dirty="0">
+                <a:ln>
+                  <a:noFill/>
+                </a:ln>
+                <a:solidFill>
+                  <a:srgbClr val="000000"/>
+                </a:solidFill>
+                <a:effectLst/>
+                <a:latin typeface="Courier New" panose="02070309020205020404" pitchFamily="49" charset="0"/>
+                <a:cs typeface="Courier New" panose="02070309020205020404" pitchFamily="49" charset="0"/>
+              </a:rPr>
+              <a:t>                        .filter(</a:t>
+            </a:r>
+            <a:r>
+              <a:rPr kumimoji="0" lang="en-US" altLang="en-US" sz="1400" b="0" i="0" u="none" strike="noStrike" cap="none" normalizeH="0" baseline="0" dirty="0" err="1">
+                <a:ln>
+                  <a:noFill/>
+                </a:ln>
+                <a:solidFill>
+                  <a:srgbClr val="000000"/>
+                </a:solidFill>
+                <a:effectLst/>
+                <a:latin typeface="Courier New" panose="02070309020205020404" pitchFamily="49" charset="0"/>
+                <a:cs typeface="Courier New" panose="02070309020205020404" pitchFamily="49" charset="0"/>
+              </a:rPr>
+              <a:t>resComponent</a:t>
+            </a:r>
+            <a:r>
+              <a:rPr kumimoji="0" lang="en-US" altLang="en-US" sz="1400" b="0" i="0" u="none" strike="noStrike" cap="none" normalizeH="0" baseline="0" dirty="0">
+                <a:ln>
+                  <a:noFill/>
+                </a:ln>
+                <a:solidFill>
+                  <a:srgbClr val="000000"/>
+                </a:solidFill>
+                <a:effectLst/>
+                <a:latin typeface="Courier New" panose="02070309020205020404" pitchFamily="49" charset="0"/>
+                <a:cs typeface="Courier New" panose="02070309020205020404" pitchFamily="49" charset="0"/>
+              </a:rPr>
+              <a:t> -&gt;  </a:t>
+            </a:r>
+            <a:r>
+              <a:rPr kumimoji="0" lang="en-US" altLang="en-US" sz="1400" b="0" i="0" u="none" strike="noStrike" cap="none" normalizeH="0" baseline="0" dirty="0" err="1">
+                <a:ln>
+                  <a:noFill/>
+                </a:ln>
+                <a:solidFill>
+                  <a:srgbClr val="000000"/>
+                </a:solidFill>
+                <a:effectLst/>
+                <a:latin typeface="Courier New" panose="02070309020205020404" pitchFamily="49" charset="0"/>
+                <a:cs typeface="Courier New" panose="02070309020205020404" pitchFamily="49" charset="0"/>
+              </a:rPr>
+              <a:t>resComponent.getSequence</a:t>
+            </a:r>
+            <a:r>
+              <a:rPr kumimoji="0" lang="en-US" altLang="en-US" sz="1400" b="0" i="0" u="none" strike="noStrike" cap="none" normalizeH="0" baseline="0" dirty="0">
+                <a:ln>
+                  <a:noFill/>
+                </a:ln>
+                <a:solidFill>
+                  <a:srgbClr val="000000"/>
+                </a:solidFill>
+                <a:effectLst/>
+                <a:latin typeface="Courier New" panose="02070309020205020404" pitchFamily="49" charset="0"/>
+                <a:cs typeface="Courier New" panose="02070309020205020404" pitchFamily="49" charset="0"/>
+              </a:rPr>
+              <a:t>() == </a:t>
+            </a:r>
+            <a:r>
+              <a:rPr kumimoji="0" lang="en-US" altLang="en-US" sz="1400" b="0" i="0" u="none" strike="noStrike" cap="none" normalizeH="0" baseline="0" dirty="0">
+                <a:ln>
+                  <a:noFill/>
+                </a:ln>
+                <a:solidFill>
+                  <a:srgbClr val="0000FF"/>
+                </a:solidFill>
+                <a:effectLst/>
+                <a:latin typeface="Courier New" panose="02070309020205020404" pitchFamily="49" charset="0"/>
+                <a:cs typeface="Courier New" panose="02070309020205020404" pitchFamily="49" charset="0"/>
+              </a:rPr>
+              <a:t>1</a:t>
+            </a:r>
+            <a:r>
+              <a:rPr kumimoji="0" lang="en-US" altLang="en-US" sz="1400" b="0" i="0" u="none" strike="noStrike" cap="none" normalizeH="0" baseline="0" dirty="0">
+                <a:ln>
+                  <a:noFill/>
+                </a:ln>
+                <a:solidFill>
+                  <a:srgbClr val="000000"/>
+                </a:solidFill>
+                <a:effectLst/>
+                <a:latin typeface="Courier New" panose="02070309020205020404" pitchFamily="49" charset="0"/>
+                <a:cs typeface="Courier New" panose="02070309020205020404" pitchFamily="49" charset="0"/>
+              </a:rPr>
+              <a:t>)</a:t>
+            </a:r>
+            <a:br>
+              <a:rPr kumimoji="0" lang="en-US" altLang="en-US" sz="1400" b="0" i="0" u="none" strike="noStrike" cap="none" normalizeH="0" baseline="0" dirty="0">
+                <a:ln>
+                  <a:noFill/>
+                </a:ln>
+                <a:solidFill>
+                  <a:srgbClr val="000000"/>
+                </a:solidFill>
+                <a:effectLst/>
+                <a:latin typeface="Courier New" panose="02070309020205020404" pitchFamily="49" charset="0"/>
+                <a:cs typeface="Courier New" panose="02070309020205020404" pitchFamily="49" charset="0"/>
+              </a:rPr>
+            </a:br>
+            <a:r>
+              <a:rPr kumimoji="0" lang="en-US" altLang="en-US" sz="1400" b="0" i="0" u="none" strike="noStrike" cap="none" normalizeH="0" baseline="0" dirty="0">
+                <a:ln>
+                  <a:noFill/>
+                </a:ln>
+                <a:solidFill>
+                  <a:srgbClr val="000000"/>
+                </a:solidFill>
+                <a:effectLst/>
+                <a:latin typeface="Courier New" panose="02070309020205020404" pitchFamily="49" charset="0"/>
+                <a:cs typeface="Courier New" panose="02070309020205020404" pitchFamily="49" charset="0"/>
+              </a:rPr>
+              <a:t>                        .map(</a:t>
+            </a:r>
+            <a:r>
+              <a:rPr kumimoji="0" lang="en-US" altLang="en-US" sz="1400" b="0" i="0" u="none" strike="noStrike" cap="none" normalizeH="0" baseline="0" dirty="0" err="1">
+                <a:ln>
+                  <a:noFill/>
+                </a:ln>
+                <a:solidFill>
+                  <a:srgbClr val="000000"/>
+                </a:solidFill>
+                <a:effectLst/>
+                <a:latin typeface="Courier New" panose="02070309020205020404" pitchFamily="49" charset="0"/>
+                <a:cs typeface="Courier New" panose="02070309020205020404" pitchFamily="49" charset="0"/>
+              </a:rPr>
+              <a:t>resComponent</a:t>
+            </a:r>
+            <a:r>
+              <a:rPr kumimoji="0" lang="en-US" altLang="en-US" sz="1400" b="0" i="0" u="none" strike="noStrike" cap="none" normalizeH="0" baseline="0" dirty="0">
+                <a:ln>
+                  <a:noFill/>
+                </a:ln>
+                <a:solidFill>
+                  <a:srgbClr val="000000"/>
+                </a:solidFill>
+                <a:effectLst/>
+                <a:latin typeface="Courier New" panose="02070309020205020404" pitchFamily="49" charset="0"/>
+                <a:cs typeface="Courier New" panose="02070309020205020404" pitchFamily="49" charset="0"/>
+              </a:rPr>
+              <a:t> -&gt; </a:t>
+            </a:r>
+            <a:r>
+              <a:rPr kumimoji="0" lang="en-US" altLang="en-US" sz="1400" b="0" i="0" u="none" strike="noStrike" cap="none" normalizeH="0" baseline="0" dirty="0" err="1">
+                <a:ln>
+                  <a:noFill/>
+                </a:ln>
+                <a:solidFill>
+                  <a:srgbClr val="000000"/>
+                </a:solidFill>
+                <a:effectLst/>
+                <a:latin typeface="Courier New" panose="02070309020205020404" pitchFamily="49" charset="0"/>
+                <a:cs typeface="Courier New" panose="02070309020205020404" pitchFamily="49" charset="0"/>
+              </a:rPr>
+              <a:t>resComponent.getPolicies</a:t>
+            </a:r>
+            <a:r>
+              <a:rPr kumimoji="0" lang="en-US" altLang="en-US" sz="1400" b="0" i="0" u="none" strike="noStrike" cap="none" normalizeH="0" baseline="0" dirty="0">
+                <a:ln>
+                  <a:noFill/>
+                </a:ln>
+                <a:solidFill>
+                  <a:srgbClr val="000000"/>
+                </a:solidFill>
+                <a:effectLst/>
+                <a:latin typeface="Courier New" panose="02070309020205020404" pitchFamily="49" charset="0"/>
+                <a:cs typeface="Courier New" panose="02070309020205020404" pitchFamily="49" charset="0"/>
+              </a:rPr>
+              <a:t>())</a:t>
+            </a:r>
+            <a:br>
+              <a:rPr kumimoji="0" lang="en-US" altLang="en-US" sz="1400" b="0" i="0" u="none" strike="noStrike" cap="none" normalizeH="0" baseline="0" dirty="0">
+                <a:ln>
+                  <a:noFill/>
+                </a:ln>
+                <a:solidFill>
+                  <a:srgbClr val="000000"/>
+                </a:solidFill>
+                <a:effectLst/>
+                <a:latin typeface="Courier New" panose="02070309020205020404" pitchFamily="49" charset="0"/>
+                <a:cs typeface="Courier New" panose="02070309020205020404" pitchFamily="49" charset="0"/>
+              </a:rPr>
+            </a:br>
+            <a:r>
+              <a:rPr kumimoji="0" lang="en-US" altLang="en-US" sz="1400" b="0" i="0" u="none" strike="noStrike" cap="none" normalizeH="0" baseline="0" dirty="0">
+                <a:ln>
+                  <a:noFill/>
+                </a:ln>
+                <a:solidFill>
+                  <a:srgbClr val="000000"/>
+                </a:solidFill>
+                <a:effectLst/>
+                <a:latin typeface="Courier New" panose="02070309020205020404" pitchFamily="49" charset="0"/>
+                <a:cs typeface="Courier New" panose="02070309020205020404" pitchFamily="49" charset="0"/>
+              </a:rPr>
+              <a:t>                        .</a:t>
+            </a:r>
+            <a:r>
+              <a:rPr kumimoji="0" lang="en-US" altLang="en-US" sz="1400" b="0" i="0" u="none" strike="noStrike" cap="none" normalizeH="0" baseline="0" dirty="0" err="1">
+                <a:ln>
+                  <a:noFill/>
+                </a:ln>
+                <a:solidFill>
+                  <a:srgbClr val="000000"/>
+                </a:solidFill>
+                <a:effectLst/>
+                <a:latin typeface="Courier New" panose="02070309020205020404" pitchFamily="49" charset="0"/>
+                <a:cs typeface="Courier New" panose="02070309020205020404" pitchFamily="49" charset="0"/>
+              </a:rPr>
+              <a:t>flatMap</a:t>
+            </a:r>
+            <a:r>
+              <a:rPr kumimoji="0" lang="en-US" altLang="en-US" sz="1400" b="0" i="0" u="none" strike="noStrike" cap="none" normalizeH="0" baseline="0" dirty="0">
+                <a:ln>
+                  <a:noFill/>
+                </a:ln>
+                <a:solidFill>
+                  <a:srgbClr val="000000"/>
+                </a:solidFill>
+                <a:effectLst/>
+                <a:latin typeface="Courier New" panose="02070309020205020404" pitchFamily="49" charset="0"/>
+                <a:cs typeface="Courier New" panose="02070309020205020404" pitchFamily="49" charset="0"/>
+              </a:rPr>
+              <a:t>(Collection::stream)</a:t>
+            </a:r>
+            <a:br>
+              <a:rPr kumimoji="0" lang="en-US" altLang="en-US" sz="1400" b="0" i="0" u="none" strike="noStrike" cap="none" normalizeH="0" baseline="0" dirty="0">
+                <a:ln>
+                  <a:noFill/>
+                </a:ln>
+                <a:solidFill>
+                  <a:srgbClr val="000000"/>
+                </a:solidFill>
+                <a:effectLst/>
+                <a:latin typeface="Courier New" panose="02070309020205020404" pitchFamily="49" charset="0"/>
+                <a:cs typeface="Courier New" panose="02070309020205020404" pitchFamily="49" charset="0"/>
+              </a:rPr>
+            </a:br>
+            <a:r>
+              <a:rPr kumimoji="0" lang="en-US" altLang="en-US" sz="1400" b="0" i="0" u="none" strike="noStrike" cap="none" normalizeH="0" baseline="0" dirty="0">
+                <a:ln>
+                  <a:noFill/>
+                </a:ln>
+                <a:solidFill>
+                  <a:srgbClr val="000000"/>
+                </a:solidFill>
+                <a:effectLst/>
+                <a:latin typeface="Courier New" panose="02070309020205020404" pitchFamily="49" charset="0"/>
+                <a:cs typeface="Courier New" panose="02070309020205020404" pitchFamily="49" charset="0"/>
+              </a:rPr>
+              <a:t>                        .map(Policy::</a:t>
+            </a:r>
+            <a:r>
+              <a:rPr kumimoji="0" lang="en-US" altLang="en-US" sz="1400" b="0" i="0" u="none" strike="noStrike" cap="none" normalizeH="0" baseline="0" dirty="0" err="1">
+                <a:ln>
+                  <a:noFill/>
+                </a:ln>
+                <a:solidFill>
+                  <a:srgbClr val="000000"/>
+                </a:solidFill>
+                <a:effectLst/>
+                <a:latin typeface="Courier New" panose="02070309020205020404" pitchFamily="49" charset="0"/>
+                <a:cs typeface="Courier New" panose="02070309020205020404" pitchFamily="49" charset="0"/>
+              </a:rPr>
+              <a:t>getPolicyCode</a:t>
+            </a:r>
+            <a:r>
+              <a:rPr kumimoji="0" lang="en-US" altLang="en-US" sz="1400" b="0" i="0" u="none" strike="noStrike" cap="none" normalizeH="0" baseline="0" dirty="0">
+                <a:ln>
+                  <a:noFill/>
+                </a:ln>
+                <a:solidFill>
+                  <a:srgbClr val="000000"/>
+                </a:solidFill>
+                <a:effectLst/>
+                <a:latin typeface="Courier New" panose="02070309020205020404" pitchFamily="49" charset="0"/>
+                <a:cs typeface="Courier New" panose="02070309020205020404" pitchFamily="49" charset="0"/>
+              </a:rPr>
+              <a:t>)</a:t>
+            </a:r>
+            <a:br>
+              <a:rPr kumimoji="0" lang="en-US" altLang="en-US" sz="1400" b="0" i="0" u="none" strike="noStrike" cap="none" normalizeH="0" baseline="0" dirty="0">
+                <a:ln>
+                  <a:noFill/>
+                </a:ln>
+                <a:solidFill>
+                  <a:srgbClr val="000000"/>
+                </a:solidFill>
+                <a:effectLst/>
+                <a:latin typeface="Courier New" panose="02070309020205020404" pitchFamily="49" charset="0"/>
+                <a:cs typeface="Courier New" panose="02070309020205020404" pitchFamily="49" charset="0"/>
+              </a:rPr>
+            </a:br>
+            <a:r>
+              <a:rPr kumimoji="0" lang="en-US" altLang="en-US" sz="1400" b="0" i="0" u="none" strike="noStrike" cap="none" normalizeH="0" baseline="0" dirty="0">
+                <a:ln>
+                  <a:noFill/>
+                </a:ln>
+                <a:solidFill>
+                  <a:srgbClr val="000000"/>
+                </a:solidFill>
+                <a:effectLst/>
+                <a:latin typeface="Courier New" panose="02070309020205020404" pitchFamily="49" charset="0"/>
+                <a:cs typeface="Courier New" panose="02070309020205020404" pitchFamily="49" charset="0"/>
+              </a:rPr>
+              <a:t>                        .collect(</a:t>
+            </a:r>
+            <a:r>
+              <a:rPr kumimoji="0" lang="en-US" altLang="en-US" sz="1400" b="0" i="1" u="none" strike="noStrike" cap="none" normalizeH="0" baseline="0" dirty="0" err="1">
+                <a:ln>
+                  <a:noFill/>
+                </a:ln>
+                <a:solidFill>
+                  <a:srgbClr val="000000"/>
+                </a:solidFill>
+                <a:effectLst/>
+                <a:latin typeface="Courier New" panose="02070309020205020404" pitchFamily="49" charset="0"/>
+                <a:cs typeface="Courier New" panose="02070309020205020404" pitchFamily="49" charset="0"/>
+              </a:rPr>
+              <a:t>toList</a:t>
+            </a:r>
+            <a:r>
+              <a:rPr kumimoji="0" lang="en-US" altLang="en-US" sz="1400" b="0" i="0" u="none" strike="noStrike" cap="none" normalizeH="0" baseline="0" dirty="0">
+                <a:ln>
+                  <a:noFill/>
+                </a:ln>
+                <a:solidFill>
+                  <a:srgbClr val="000000"/>
+                </a:solidFill>
+                <a:effectLst/>
+                <a:latin typeface="Courier New" panose="02070309020205020404" pitchFamily="49" charset="0"/>
+                <a:cs typeface="Courier New" panose="02070309020205020404" pitchFamily="49" charset="0"/>
+              </a:rPr>
+              <a:t>());</a:t>
+            </a:r>
+            <a:br>
+              <a:rPr kumimoji="0" lang="en-US" altLang="en-US" sz="1400" b="0" i="0" u="none" strike="noStrike" cap="none" normalizeH="0" baseline="0" dirty="0">
+                <a:ln>
+                  <a:noFill/>
+                </a:ln>
+                <a:solidFill>
+                  <a:srgbClr val="000000"/>
+                </a:solidFill>
+                <a:effectLst/>
+                <a:latin typeface="Courier New" panose="02070309020205020404" pitchFamily="49" charset="0"/>
+                <a:cs typeface="Courier New" panose="02070309020205020404" pitchFamily="49" charset="0"/>
+              </a:rPr>
+            </a:br>
+            <a:r>
+              <a:rPr kumimoji="0" lang="en-US" altLang="en-US" sz="1400" b="0" i="0" u="none" strike="noStrike" cap="none" normalizeH="0" baseline="0" dirty="0">
+                <a:ln>
+                  <a:noFill/>
+                </a:ln>
+                <a:solidFill>
+                  <a:srgbClr val="000000"/>
+                </a:solidFill>
+                <a:effectLst/>
+                <a:latin typeface="Courier New" panose="02070309020205020404" pitchFamily="49" charset="0"/>
+                <a:cs typeface="Courier New" panose="02070309020205020404" pitchFamily="49" charset="0"/>
+              </a:rPr>
+              <a:t>   }</a:t>
+            </a:r>
+            <a:endParaRPr kumimoji="0" lang="en-US" altLang="en-US" sz="1400" b="0" i="0" u="none" strike="noStrike" cap="none" normalizeH="0" baseline="0" dirty="0">
+              <a:ln>
+                <a:noFill/>
+              </a:ln>
+              <a:solidFill>
+                <a:schemeClr val="tx1"/>
+              </a:solidFill>
+              <a:effectLst/>
+              <a:latin typeface="Arial" panose="020B0604020202020204" pitchFamily="34" charset="0"/>
+            </a:endParaRPr>
+          </a:p>
+        </p:txBody>
+      </p:sp>
+    </p:spTree>
+    <p:extLst>
+      <p:ext uri="{BB962C8B-B14F-4D97-AF65-F5344CB8AC3E}">
+        <p14:creationId xmlns:p14="http://schemas.microsoft.com/office/powerpoint/2010/main" val="3092909730"/>
+      </p:ext>
+    </p:extLst>
+  </p:cSld>
+  <p:clrMapOvr>
+    <a:masterClrMapping/>
+  </p:clrMapOvr>
+</p:sld>
+</file>
+
+<file path=ppt/slides/slide56.xml><?xml version="1.0" encoding="utf-8"?>
+<p:sld xmlns:a="http://schemas.openxmlformats.org/drawingml/2006/main" xmlns:r="http://schemas.openxmlformats.org/officeDocument/2006/relationships" xmlns:p="http://schemas.openxmlformats.org/presentationml/2006/main">
+  <p:cSld>
+    <p:spTree>
+      <p:nvGrpSpPr>
+        <p:cNvPr id="1" name=""/>
+        <p:cNvGrpSpPr/>
+        <p:nvPr/>
+      </p:nvGrpSpPr>
+      <p:grpSpPr>
+        <a:xfrm>
+          <a:off x="0" y="0"/>
+          <a:ext cx="0" cy="0"/>
+          <a:chOff x="0" y="0"/>
+          <a:chExt cx="0" cy="0"/>
+        </a:xfrm>
+      </p:grpSpPr>
+      <p:sp>
+        <p:nvSpPr>
+          <p:cNvPr id="2" name="Text Placeholder 1"/>
+          <p:cNvSpPr>
+            <a:spLocks noGrp="1"/>
+          </p:cNvSpPr>
+          <p:nvPr>
+            <p:ph type="body" sz="quarter" idx="12"/>
+          </p:nvPr>
+        </p:nvSpPr>
+        <p:spPr/>
+        <p:txBody>
+          <a:bodyPr/>
+          <a:lstStyle/>
+          <a:p>
+            <a:r>
+              <a:rPr lang="en-IE" dirty="0"/>
+              <a:t>Practice </a:t>
+            </a:r>
+            <a:r>
+              <a:rPr lang="en-US" altLang="zh-CN" dirty="0"/>
+              <a:t>3</a:t>
+            </a:r>
+            <a:r>
+              <a:rPr lang="en-IE" dirty="0"/>
+              <a:t> in TDP </a:t>
+            </a:r>
+          </a:p>
+        </p:txBody>
+      </p:sp>
+      <p:sp>
+        <p:nvSpPr>
+          <p:cNvPr id="5" name="Text Placeholder 1"/>
+          <p:cNvSpPr>
+            <a:spLocks noGrp="1"/>
+          </p:cNvSpPr>
+          <p:nvPr>
+            <p:ph type="body" sz="quarter" idx="12"/>
+          </p:nvPr>
+        </p:nvSpPr>
+        <p:spPr>
+          <a:xfrm>
+            <a:off x="724939" y="1693156"/>
+            <a:ext cx="10205658" cy="895299"/>
+          </a:xfrm>
+        </p:spPr>
+        <p:txBody>
+          <a:bodyPr/>
+          <a:lstStyle/>
+          <a:p>
+            <a:r>
+              <a:rPr lang="en-IE" sz="2800" dirty="0" err="1"/>
+              <a:t>Valida</a:t>
+            </a:r>
+            <a:r>
+              <a:rPr lang="en-IE" sz="2800" dirty="0"/>
+              <a:t> the reservation in request, in case there is no policy code in </a:t>
+            </a:r>
+            <a:r>
+              <a:rPr lang="en-IE" sz="2800" dirty="0" err="1"/>
+              <a:t>rescomponent</a:t>
+            </a:r>
+            <a:r>
+              <a:rPr lang="en-IE" sz="2800" dirty="0"/>
+              <a:t>, throw an </a:t>
+            </a:r>
+            <a:r>
+              <a:rPr lang="en-IE" sz="2800" dirty="0" err="1"/>
+              <a:t>AnyException</a:t>
+            </a:r>
+            <a:endParaRPr lang="en-IE" sz="2800" dirty="0"/>
+          </a:p>
+        </p:txBody>
+      </p:sp>
+      <p:sp>
+        <p:nvSpPr>
+          <p:cNvPr id="3" name="Rectangle 1"/>
+          <p:cNvSpPr>
+            <a:spLocks noChangeArrowheads="1"/>
+          </p:cNvSpPr>
+          <p:nvPr/>
+        </p:nvSpPr>
+        <p:spPr bwMode="auto">
+          <a:xfrm>
+            <a:off x="724939" y="3048524"/>
+            <a:ext cx="10824636" cy="2800767"/>
+          </a:xfrm>
+          <a:prstGeom prst="rect">
+            <a:avLst/>
+          </a:prstGeom>
+          <a:solidFill>
+            <a:srgbClr val="FFFFFF"/>
+          </a:solidFill>
+          <a:ln>
+            <a:noFill/>
+          </a:ln>
+          <a:effectLst/>
+          <a:extLst>
+            <a:ext uri="{91240B29-F687-4F45-9708-019B960494DF}">
+              <a14:hiddenLine xmlns:a14="http://schemas.microsoft.com/office/drawing/2010/main" w="9525">
+                <a:solidFill>
+                  <a:schemeClr val="tx1"/>
+                </a:solidFill>
+                <a:miter lim="800000"/>
+                <a:headEnd/>
+                <a:tailEnd/>
+              </a14:hiddenLine>
+            </a:ext>
+            <a:ext uri="{AF507438-7753-43E0-B8FC-AC1667EBCBE1}">
+              <a14:hiddenEffects xmlns:a14="http://schemas.microsoft.com/office/drawing/2010/main">
+                <a:effectLst>
+                  <a:outerShdw dist="35921" dir="2700000" algn="ctr" rotWithShape="0">
+                    <a:schemeClr val="bg2"/>
+                  </a:outerShdw>
+                </a:effectLst>
+              </a14:hiddenEffects>
+            </a:ext>
+          </a:extLst>
+        </p:spPr>
+        <p:txBody>
+          <a:bodyPr vert="horz" wrap="square" lIns="91440" tIns="45720" rIns="91440" bIns="45720" numCol="1" anchor="ctr" anchorCtr="0" compatLnSpc="1">
+            <a:prstTxWarp prst="textNoShape">
+              <a:avLst/>
+            </a:prstTxWarp>
+            <a:spAutoFit/>
+          </a:bodyPr>
+          <a:lstStyle/>
+          <a:p>
+            <a:pPr marL="0" marR="0" lvl="0" indent="0" algn="l" defTabSz="914400" rtl="0" eaLnBrk="0" fontAlgn="base" latinLnBrk="0" hangingPunct="0">
+              <a:lnSpc>
+                <a:spcPct val="100000"/>
+              </a:lnSpc>
+              <a:spcBef>
+                <a:spcPct val="0"/>
+              </a:spcBef>
+              <a:spcAft>
+                <a:spcPct val="0"/>
+              </a:spcAft>
+              <a:buClrTx/>
+              <a:buSzTx/>
+              <a:buFontTx/>
+              <a:buNone/>
+              <a:tabLst/>
+            </a:pPr>
+            <a:r>
+              <a:rPr kumimoji="0" lang="en-US" altLang="en-US" sz="1600" b="1" i="0" u="none" strike="noStrike" cap="none" normalizeH="0" baseline="0" dirty="0">
+                <a:ln>
+                  <a:noFill/>
+                </a:ln>
+                <a:solidFill>
+                  <a:srgbClr val="000080"/>
+                </a:solidFill>
+                <a:effectLst/>
+                <a:latin typeface="Courier New" panose="02070309020205020404" pitchFamily="49" charset="0"/>
+                <a:cs typeface="Courier New" panose="02070309020205020404" pitchFamily="49" charset="0"/>
+              </a:rPr>
+              <a:t>private static </a:t>
+            </a:r>
+            <a:r>
+              <a:rPr kumimoji="0" lang="en-US" altLang="en-US" sz="1600" b="0" i="0" u="none" strike="noStrike" cap="none" normalizeH="0" baseline="0" dirty="0">
+                <a:ln>
+                  <a:noFill/>
+                </a:ln>
+                <a:solidFill>
+                  <a:srgbClr val="000000"/>
+                </a:solidFill>
+                <a:effectLst/>
+                <a:latin typeface="Courier New" panose="02070309020205020404" pitchFamily="49" charset="0"/>
+                <a:cs typeface="Courier New" panose="02070309020205020404" pitchFamily="49" charset="0"/>
+              </a:rPr>
+              <a:t>String validateAnyPolicyCodeInJava8(List&lt;Reservation&gt; reservations) {</a:t>
+            </a:r>
+            <a:br>
+              <a:rPr kumimoji="0" lang="en-US" altLang="en-US" sz="1600" b="0" i="0" u="none" strike="noStrike" cap="none" normalizeH="0" baseline="0" dirty="0">
+                <a:ln>
+                  <a:noFill/>
+                </a:ln>
+                <a:solidFill>
+                  <a:srgbClr val="000000"/>
+                </a:solidFill>
+                <a:effectLst/>
+                <a:latin typeface="Courier New" panose="02070309020205020404" pitchFamily="49" charset="0"/>
+                <a:cs typeface="Courier New" panose="02070309020205020404" pitchFamily="49" charset="0"/>
+              </a:rPr>
+            </a:br>
+            <a:r>
+              <a:rPr kumimoji="0" lang="en-US" altLang="en-US" sz="1600" b="0" i="0" u="none" strike="noStrike" cap="none" normalizeH="0" baseline="0" dirty="0">
+                <a:ln>
+                  <a:noFill/>
+                </a:ln>
+                <a:solidFill>
+                  <a:srgbClr val="000000"/>
+                </a:solidFill>
+                <a:effectLst/>
+                <a:latin typeface="Courier New" panose="02070309020205020404" pitchFamily="49" charset="0"/>
+                <a:cs typeface="Courier New" panose="02070309020205020404" pitchFamily="49" charset="0"/>
+              </a:rPr>
+              <a:t>    </a:t>
+            </a:r>
+            <a:r>
+              <a:rPr kumimoji="0" lang="en-US" altLang="en-US" sz="1600" b="1" i="0" u="none" strike="noStrike" cap="none" normalizeH="0" baseline="0" dirty="0">
+                <a:ln>
+                  <a:noFill/>
+                </a:ln>
+                <a:solidFill>
+                  <a:srgbClr val="000080"/>
+                </a:solidFill>
+                <a:effectLst/>
+                <a:latin typeface="Courier New" panose="02070309020205020404" pitchFamily="49" charset="0"/>
+                <a:cs typeface="Courier New" panose="02070309020205020404" pitchFamily="49" charset="0"/>
+              </a:rPr>
+              <a:t>return </a:t>
+            </a:r>
+            <a:r>
+              <a:rPr kumimoji="0" lang="en-US" altLang="en-US" sz="1600" b="0" i="0" u="none" strike="noStrike" cap="none" normalizeH="0" baseline="0" dirty="0" err="1">
+                <a:ln>
+                  <a:noFill/>
+                </a:ln>
+                <a:solidFill>
+                  <a:srgbClr val="000000"/>
+                </a:solidFill>
+                <a:effectLst/>
+                <a:latin typeface="Courier New" panose="02070309020205020404" pitchFamily="49" charset="0"/>
+                <a:cs typeface="Courier New" panose="02070309020205020404" pitchFamily="49" charset="0"/>
+              </a:rPr>
+              <a:t>reservations.stream</a:t>
+            </a:r>
+            <a:r>
+              <a:rPr kumimoji="0" lang="en-US" altLang="en-US" sz="1600" b="0" i="0" u="none" strike="noStrike" cap="none" normalizeH="0" baseline="0" dirty="0">
+                <a:ln>
+                  <a:noFill/>
+                </a:ln>
+                <a:solidFill>
+                  <a:srgbClr val="000000"/>
+                </a:solidFill>
+                <a:effectLst/>
+                <a:latin typeface="Courier New" panose="02070309020205020404" pitchFamily="49" charset="0"/>
+                <a:cs typeface="Courier New" panose="02070309020205020404" pitchFamily="49" charset="0"/>
+              </a:rPr>
+              <a:t>()</a:t>
+            </a:r>
+            <a:br>
+              <a:rPr kumimoji="0" lang="en-US" altLang="en-US" sz="1600" b="0" i="0" u="none" strike="noStrike" cap="none" normalizeH="0" baseline="0" dirty="0">
+                <a:ln>
+                  <a:noFill/>
+                </a:ln>
+                <a:solidFill>
+                  <a:srgbClr val="000000"/>
+                </a:solidFill>
+                <a:effectLst/>
+                <a:latin typeface="Courier New" panose="02070309020205020404" pitchFamily="49" charset="0"/>
+                <a:cs typeface="Courier New" panose="02070309020205020404" pitchFamily="49" charset="0"/>
+              </a:rPr>
+            </a:br>
+            <a:r>
+              <a:rPr kumimoji="0" lang="en-US" altLang="en-US" sz="1600" b="0" i="0" u="none" strike="noStrike" cap="none" normalizeH="0" baseline="0" dirty="0">
+                <a:ln>
+                  <a:noFill/>
+                </a:ln>
+                <a:solidFill>
+                  <a:srgbClr val="000000"/>
+                </a:solidFill>
+                <a:effectLst/>
+                <a:latin typeface="Courier New" panose="02070309020205020404" pitchFamily="49" charset="0"/>
+                <a:cs typeface="Courier New" panose="02070309020205020404" pitchFamily="49" charset="0"/>
+              </a:rPr>
+              <a:t>            .map(reservation -&gt; </a:t>
+            </a:r>
+            <a:r>
+              <a:rPr kumimoji="0" lang="en-US" altLang="en-US" sz="1600" b="0" i="0" u="none" strike="noStrike" cap="none" normalizeH="0" baseline="0" dirty="0" err="1">
+                <a:ln>
+                  <a:noFill/>
+                </a:ln>
+                <a:solidFill>
+                  <a:srgbClr val="000000"/>
+                </a:solidFill>
+                <a:effectLst/>
+                <a:latin typeface="Courier New" panose="02070309020205020404" pitchFamily="49" charset="0"/>
+                <a:cs typeface="Courier New" panose="02070309020205020404" pitchFamily="49" charset="0"/>
+              </a:rPr>
+              <a:t>reservation.getResComponents</a:t>
+            </a:r>
+            <a:r>
+              <a:rPr kumimoji="0" lang="en-US" altLang="en-US" sz="1600" b="0" i="0" u="none" strike="noStrike" cap="none" normalizeH="0" baseline="0" dirty="0">
+                <a:ln>
+                  <a:noFill/>
+                </a:ln>
+                <a:solidFill>
+                  <a:srgbClr val="000000"/>
+                </a:solidFill>
+                <a:effectLst/>
+                <a:latin typeface="Courier New" panose="02070309020205020404" pitchFamily="49" charset="0"/>
+                <a:cs typeface="Courier New" panose="02070309020205020404" pitchFamily="49" charset="0"/>
+              </a:rPr>
+              <a:t>())</a:t>
+            </a:r>
+            <a:br>
+              <a:rPr kumimoji="0" lang="en-US" altLang="en-US" sz="1600" b="0" i="0" u="none" strike="noStrike" cap="none" normalizeH="0" baseline="0" dirty="0">
+                <a:ln>
+                  <a:noFill/>
+                </a:ln>
+                <a:solidFill>
+                  <a:srgbClr val="000000"/>
+                </a:solidFill>
+                <a:effectLst/>
+                <a:latin typeface="Courier New" panose="02070309020205020404" pitchFamily="49" charset="0"/>
+                <a:cs typeface="Courier New" panose="02070309020205020404" pitchFamily="49" charset="0"/>
+              </a:rPr>
+            </a:br>
+            <a:r>
+              <a:rPr kumimoji="0" lang="en-US" altLang="en-US" sz="1600" b="0" i="0" u="none" strike="noStrike" cap="none" normalizeH="0" baseline="0" dirty="0">
+                <a:ln>
+                  <a:noFill/>
+                </a:ln>
+                <a:solidFill>
+                  <a:srgbClr val="000000"/>
+                </a:solidFill>
+                <a:effectLst/>
+                <a:latin typeface="Courier New" panose="02070309020205020404" pitchFamily="49" charset="0"/>
+                <a:cs typeface="Courier New" panose="02070309020205020404" pitchFamily="49" charset="0"/>
+              </a:rPr>
+              <a:t>            .</a:t>
+            </a:r>
+            <a:r>
+              <a:rPr kumimoji="0" lang="en-US" altLang="en-US" sz="1600" b="0" i="0" u="none" strike="noStrike" cap="none" normalizeH="0" baseline="0" dirty="0" err="1">
+                <a:ln>
+                  <a:noFill/>
+                </a:ln>
+                <a:solidFill>
+                  <a:srgbClr val="000000"/>
+                </a:solidFill>
+                <a:effectLst/>
+                <a:latin typeface="Courier New" panose="02070309020205020404" pitchFamily="49" charset="0"/>
+                <a:cs typeface="Courier New" panose="02070309020205020404" pitchFamily="49" charset="0"/>
+              </a:rPr>
+              <a:t>flatMap</a:t>
+            </a:r>
+            <a:r>
+              <a:rPr kumimoji="0" lang="en-US" altLang="en-US" sz="1600" b="0" i="0" u="none" strike="noStrike" cap="none" normalizeH="0" baseline="0" dirty="0">
+                <a:ln>
+                  <a:noFill/>
+                </a:ln>
+                <a:solidFill>
+                  <a:srgbClr val="000000"/>
+                </a:solidFill>
+                <a:effectLst/>
+                <a:latin typeface="Courier New" panose="02070309020205020404" pitchFamily="49" charset="0"/>
+                <a:cs typeface="Courier New" panose="02070309020205020404" pitchFamily="49" charset="0"/>
+              </a:rPr>
+              <a:t>(Collection::stream)</a:t>
+            </a:r>
+            <a:br>
+              <a:rPr kumimoji="0" lang="en-US" altLang="en-US" sz="1600" b="0" i="0" u="none" strike="noStrike" cap="none" normalizeH="0" baseline="0" dirty="0">
+                <a:ln>
+                  <a:noFill/>
+                </a:ln>
+                <a:solidFill>
+                  <a:srgbClr val="000000"/>
+                </a:solidFill>
+                <a:effectLst/>
+                <a:latin typeface="Courier New" panose="02070309020205020404" pitchFamily="49" charset="0"/>
+                <a:cs typeface="Courier New" panose="02070309020205020404" pitchFamily="49" charset="0"/>
+              </a:rPr>
+            </a:br>
+            <a:r>
+              <a:rPr kumimoji="0" lang="en-US" altLang="en-US" sz="1600" b="0" i="0" u="none" strike="noStrike" cap="none" normalizeH="0" baseline="0" dirty="0">
+                <a:ln>
+                  <a:noFill/>
+                </a:ln>
+                <a:solidFill>
+                  <a:srgbClr val="000000"/>
+                </a:solidFill>
+                <a:effectLst/>
+                <a:latin typeface="Courier New" panose="02070309020205020404" pitchFamily="49" charset="0"/>
+                <a:cs typeface="Courier New" panose="02070309020205020404" pitchFamily="49" charset="0"/>
+              </a:rPr>
+              <a:t>            .map(</a:t>
+            </a:r>
+            <a:r>
+              <a:rPr kumimoji="0" lang="en-US" altLang="en-US" sz="1600" b="0" i="0" u="none" strike="noStrike" cap="none" normalizeH="0" baseline="0" dirty="0" err="1">
+                <a:ln>
+                  <a:noFill/>
+                </a:ln>
+                <a:solidFill>
+                  <a:srgbClr val="000000"/>
+                </a:solidFill>
+                <a:effectLst/>
+                <a:latin typeface="Courier New" panose="02070309020205020404" pitchFamily="49" charset="0"/>
+                <a:cs typeface="Courier New" panose="02070309020205020404" pitchFamily="49" charset="0"/>
+              </a:rPr>
+              <a:t>resComponent</a:t>
+            </a:r>
+            <a:r>
+              <a:rPr kumimoji="0" lang="en-US" altLang="en-US" sz="1600" b="0" i="0" u="none" strike="noStrike" cap="none" normalizeH="0" baseline="0" dirty="0">
+                <a:ln>
+                  <a:noFill/>
+                </a:ln>
+                <a:solidFill>
+                  <a:srgbClr val="000000"/>
+                </a:solidFill>
+                <a:effectLst/>
+                <a:latin typeface="Courier New" panose="02070309020205020404" pitchFamily="49" charset="0"/>
+                <a:cs typeface="Courier New" panose="02070309020205020404" pitchFamily="49" charset="0"/>
+              </a:rPr>
+              <a:t> -&gt; </a:t>
+            </a:r>
+            <a:r>
+              <a:rPr kumimoji="0" lang="en-US" altLang="en-US" sz="1600" b="0" i="0" u="none" strike="noStrike" cap="none" normalizeH="0" baseline="0" dirty="0" err="1">
+                <a:ln>
+                  <a:noFill/>
+                </a:ln>
+                <a:solidFill>
+                  <a:srgbClr val="000000"/>
+                </a:solidFill>
+                <a:effectLst/>
+                <a:latin typeface="Courier New" panose="02070309020205020404" pitchFamily="49" charset="0"/>
+                <a:cs typeface="Courier New" panose="02070309020205020404" pitchFamily="49" charset="0"/>
+              </a:rPr>
+              <a:t>resComponent.getPolicies</a:t>
+            </a:r>
+            <a:r>
+              <a:rPr kumimoji="0" lang="en-US" altLang="en-US" sz="1600" b="0" i="0" u="none" strike="noStrike" cap="none" normalizeH="0" baseline="0" dirty="0">
+                <a:ln>
+                  <a:noFill/>
+                </a:ln>
+                <a:solidFill>
+                  <a:srgbClr val="000000"/>
+                </a:solidFill>
+                <a:effectLst/>
+                <a:latin typeface="Courier New" panose="02070309020205020404" pitchFamily="49" charset="0"/>
+                <a:cs typeface="Courier New" panose="02070309020205020404" pitchFamily="49" charset="0"/>
+              </a:rPr>
+              <a:t>())</a:t>
+            </a:r>
+            <a:br>
+              <a:rPr kumimoji="0" lang="en-US" altLang="en-US" sz="1600" b="0" i="0" u="none" strike="noStrike" cap="none" normalizeH="0" baseline="0" dirty="0">
+                <a:ln>
+                  <a:noFill/>
+                </a:ln>
+                <a:solidFill>
+                  <a:srgbClr val="000000"/>
+                </a:solidFill>
+                <a:effectLst/>
+                <a:latin typeface="Courier New" panose="02070309020205020404" pitchFamily="49" charset="0"/>
+                <a:cs typeface="Courier New" panose="02070309020205020404" pitchFamily="49" charset="0"/>
+              </a:rPr>
+            </a:br>
+            <a:r>
+              <a:rPr kumimoji="0" lang="en-US" altLang="en-US" sz="1600" b="0" i="0" u="none" strike="noStrike" cap="none" normalizeH="0" baseline="0" dirty="0">
+                <a:ln>
+                  <a:noFill/>
+                </a:ln>
+                <a:solidFill>
+                  <a:srgbClr val="000000"/>
+                </a:solidFill>
+                <a:effectLst/>
+                <a:latin typeface="Courier New" panose="02070309020205020404" pitchFamily="49" charset="0"/>
+                <a:cs typeface="Courier New" panose="02070309020205020404" pitchFamily="49" charset="0"/>
+              </a:rPr>
+              <a:t>            .</a:t>
+            </a:r>
+            <a:r>
+              <a:rPr kumimoji="0" lang="en-US" altLang="en-US" sz="1600" b="0" i="0" u="none" strike="noStrike" cap="none" normalizeH="0" baseline="0" dirty="0" err="1">
+                <a:ln>
+                  <a:noFill/>
+                </a:ln>
+                <a:solidFill>
+                  <a:srgbClr val="000000"/>
+                </a:solidFill>
+                <a:effectLst/>
+                <a:latin typeface="Courier New" panose="02070309020205020404" pitchFamily="49" charset="0"/>
+                <a:cs typeface="Courier New" panose="02070309020205020404" pitchFamily="49" charset="0"/>
+              </a:rPr>
+              <a:t>flatMap</a:t>
+            </a:r>
+            <a:r>
+              <a:rPr kumimoji="0" lang="en-US" altLang="en-US" sz="1600" b="0" i="0" u="none" strike="noStrike" cap="none" normalizeH="0" baseline="0" dirty="0">
+                <a:ln>
+                  <a:noFill/>
+                </a:ln>
+                <a:solidFill>
+                  <a:srgbClr val="000000"/>
+                </a:solidFill>
+                <a:effectLst/>
+                <a:latin typeface="Courier New" panose="02070309020205020404" pitchFamily="49" charset="0"/>
+                <a:cs typeface="Courier New" panose="02070309020205020404" pitchFamily="49" charset="0"/>
+              </a:rPr>
+              <a:t>(Collection::stream)</a:t>
+            </a:r>
+            <a:br>
+              <a:rPr kumimoji="0" lang="en-US" altLang="en-US" sz="1600" b="0" i="0" u="none" strike="noStrike" cap="none" normalizeH="0" baseline="0" dirty="0">
+                <a:ln>
+                  <a:noFill/>
+                </a:ln>
+                <a:solidFill>
+                  <a:srgbClr val="000000"/>
+                </a:solidFill>
+                <a:effectLst/>
+                <a:latin typeface="Courier New" panose="02070309020205020404" pitchFamily="49" charset="0"/>
+                <a:cs typeface="Courier New" panose="02070309020205020404" pitchFamily="49" charset="0"/>
+              </a:rPr>
+            </a:br>
+            <a:r>
+              <a:rPr kumimoji="0" lang="en-US" altLang="en-US" sz="1600" b="0" i="0" u="none" strike="noStrike" cap="none" normalizeH="0" baseline="0" dirty="0">
+                <a:ln>
+                  <a:noFill/>
+                </a:ln>
+                <a:solidFill>
+                  <a:srgbClr val="000000"/>
+                </a:solidFill>
+                <a:effectLst/>
+                <a:latin typeface="Courier New" panose="02070309020205020404" pitchFamily="49" charset="0"/>
+                <a:cs typeface="Courier New" panose="02070309020205020404" pitchFamily="49" charset="0"/>
+              </a:rPr>
+              <a:t>            .map(Policy::</a:t>
+            </a:r>
+            <a:r>
+              <a:rPr kumimoji="0" lang="en-US" altLang="en-US" sz="1600" b="0" i="0" u="none" strike="noStrike" cap="none" normalizeH="0" baseline="0" dirty="0" err="1">
+                <a:ln>
+                  <a:noFill/>
+                </a:ln>
+                <a:solidFill>
+                  <a:srgbClr val="000000"/>
+                </a:solidFill>
+                <a:effectLst/>
+                <a:latin typeface="Courier New" panose="02070309020205020404" pitchFamily="49" charset="0"/>
+                <a:cs typeface="Courier New" panose="02070309020205020404" pitchFamily="49" charset="0"/>
+              </a:rPr>
+              <a:t>getPolicyCode</a:t>
+            </a:r>
+            <a:r>
+              <a:rPr kumimoji="0" lang="en-US" altLang="en-US" sz="1600" b="0" i="0" u="none" strike="noStrike" cap="none" normalizeH="0" baseline="0" dirty="0">
+                <a:ln>
+                  <a:noFill/>
+                </a:ln>
+                <a:solidFill>
+                  <a:srgbClr val="000000"/>
+                </a:solidFill>
+                <a:effectLst/>
+                <a:latin typeface="Courier New" panose="02070309020205020404" pitchFamily="49" charset="0"/>
+                <a:cs typeface="Courier New" panose="02070309020205020404" pitchFamily="49" charset="0"/>
+              </a:rPr>
+              <a:t>)</a:t>
+            </a:r>
+            <a:br>
+              <a:rPr kumimoji="0" lang="en-US" altLang="en-US" sz="1600" b="0" i="0" u="none" strike="noStrike" cap="none" normalizeH="0" baseline="0" dirty="0">
+                <a:ln>
+                  <a:noFill/>
+                </a:ln>
+                <a:solidFill>
+                  <a:srgbClr val="000000"/>
+                </a:solidFill>
+                <a:effectLst/>
+                <a:latin typeface="Courier New" panose="02070309020205020404" pitchFamily="49" charset="0"/>
+                <a:cs typeface="Courier New" panose="02070309020205020404" pitchFamily="49" charset="0"/>
+              </a:rPr>
+            </a:br>
+            <a:r>
+              <a:rPr kumimoji="0" lang="en-US" altLang="en-US" sz="1600" b="0" i="0" u="none" strike="noStrike" cap="none" normalizeH="0" baseline="0" dirty="0">
+                <a:ln>
+                  <a:noFill/>
+                </a:ln>
+                <a:solidFill>
+                  <a:srgbClr val="000000"/>
+                </a:solidFill>
+                <a:effectLst/>
+                <a:latin typeface="Courier New" panose="02070309020205020404" pitchFamily="49" charset="0"/>
+                <a:cs typeface="Courier New" panose="02070309020205020404" pitchFamily="49" charset="0"/>
+              </a:rPr>
+              <a:t>            .</a:t>
+            </a:r>
+            <a:r>
+              <a:rPr kumimoji="0" lang="en-US" altLang="en-US" sz="1600" b="0" i="0" u="none" strike="noStrike" cap="none" normalizeH="0" baseline="0" dirty="0" err="1">
+                <a:ln>
+                  <a:noFill/>
+                </a:ln>
+                <a:solidFill>
+                  <a:srgbClr val="000000"/>
+                </a:solidFill>
+                <a:effectLst/>
+                <a:latin typeface="Courier New" panose="02070309020205020404" pitchFamily="49" charset="0"/>
+                <a:cs typeface="Courier New" panose="02070309020205020404" pitchFamily="49" charset="0"/>
+              </a:rPr>
+              <a:t>findAny</a:t>
+            </a:r>
+            <a:r>
+              <a:rPr kumimoji="0" lang="en-US" altLang="en-US" sz="1600" b="0" i="0" u="none" strike="noStrike" cap="none" normalizeH="0" baseline="0" dirty="0">
+                <a:ln>
+                  <a:noFill/>
+                </a:ln>
+                <a:solidFill>
+                  <a:srgbClr val="000000"/>
+                </a:solidFill>
+                <a:effectLst/>
+                <a:latin typeface="Courier New" panose="02070309020205020404" pitchFamily="49" charset="0"/>
+                <a:cs typeface="Courier New" panose="02070309020205020404" pitchFamily="49" charset="0"/>
+              </a:rPr>
+              <a:t>()</a:t>
+            </a:r>
+            <a:br>
+              <a:rPr kumimoji="0" lang="en-US" altLang="en-US" sz="1600" b="0" i="0" u="none" strike="noStrike" cap="none" normalizeH="0" baseline="0" dirty="0">
+                <a:ln>
+                  <a:noFill/>
+                </a:ln>
+                <a:solidFill>
+                  <a:srgbClr val="000000"/>
+                </a:solidFill>
+                <a:effectLst/>
+                <a:latin typeface="Courier New" panose="02070309020205020404" pitchFamily="49" charset="0"/>
+                <a:cs typeface="Courier New" panose="02070309020205020404" pitchFamily="49" charset="0"/>
+              </a:rPr>
+            </a:br>
+            <a:r>
+              <a:rPr kumimoji="0" lang="en-US" altLang="en-US" sz="1600" b="0" i="0" u="none" strike="noStrike" cap="none" normalizeH="0" baseline="0" dirty="0">
+                <a:ln>
+                  <a:noFill/>
+                </a:ln>
+                <a:solidFill>
+                  <a:srgbClr val="000000"/>
+                </a:solidFill>
+                <a:effectLst/>
+                <a:latin typeface="Courier New" panose="02070309020205020404" pitchFamily="49" charset="0"/>
+                <a:cs typeface="Courier New" panose="02070309020205020404" pitchFamily="49" charset="0"/>
+              </a:rPr>
+              <a:t>            .</a:t>
+            </a:r>
+            <a:r>
+              <a:rPr kumimoji="0" lang="en-US" altLang="en-US" sz="1600" b="0" i="0" u="none" strike="noStrike" cap="none" normalizeH="0" baseline="0" dirty="0" err="1">
+                <a:ln>
+                  <a:noFill/>
+                </a:ln>
+                <a:solidFill>
+                  <a:srgbClr val="000000"/>
+                </a:solidFill>
+                <a:effectLst/>
+                <a:latin typeface="Courier New" panose="02070309020205020404" pitchFamily="49" charset="0"/>
+                <a:cs typeface="Courier New" panose="02070309020205020404" pitchFamily="49" charset="0"/>
+              </a:rPr>
+              <a:t>orElseThrow</a:t>
+            </a:r>
+            <a:r>
+              <a:rPr kumimoji="0" lang="en-US" altLang="en-US" sz="1600" b="0" i="0" u="none" strike="noStrike" cap="none" normalizeH="0" baseline="0" dirty="0">
+                <a:ln>
+                  <a:noFill/>
+                </a:ln>
+                <a:solidFill>
+                  <a:srgbClr val="000000"/>
+                </a:solidFill>
+                <a:effectLst/>
+                <a:latin typeface="Courier New" panose="02070309020205020404" pitchFamily="49" charset="0"/>
+                <a:cs typeface="Courier New" panose="02070309020205020404" pitchFamily="49" charset="0"/>
+              </a:rPr>
+              <a:t>(() -&gt; </a:t>
+            </a:r>
+            <a:r>
+              <a:rPr kumimoji="0" lang="en-US" altLang="en-US" sz="1600" b="1" i="0" u="none" strike="noStrike" cap="none" normalizeH="0" baseline="0" dirty="0">
+                <a:ln>
+                  <a:noFill/>
+                </a:ln>
+                <a:solidFill>
+                  <a:srgbClr val="000080"/>
+                </a:solidFill>
+                <a:effectLst/>
+                <a:latin typeface="Courier New" panose="02070309020205020404" pitchFamily="49" charset="0"/>
+                <a:cs typeface="Courier New" panose="02070309020205020404" pitchFamily="49" charset="0"/>
+              </a:rPr>
+              <a:t>new </a:t>
+            </a:r>
+            <a:r>
+              <a:rPr kumimoji="0" lang="en-US" altLang="en-US" sz="1600" b="0" i="0" u="none" strike="noStrike" cap="none" normalizeH="0" baseline="0" dirty="0" err="1">
+                <a:ln>
+                  <a:noFill/>
+                </a:ln>
+                <a:solidFill>
+                  <a:srgbClr val="000000"/>
+                </a:solidFill>
+                <a:effectLst/>
+                <a:latin typeface="Courier New" panose="02070309020205020404" pitchFamily="49" charset="0"/>
+                <a:cs typeface="Courier New" panose="02070309020205020404" pitchFamily="49" charset="0"/>
+              </a:rPr>
+              <a:t>AnyException</a:t>
+            </a:r>
+            <a:r>
+              <a:rPr kumimoji="0" lang="en-US" altLang="en-US" sz="1600" b="0" i="0" u="none" strike="noStrike" cap="none" normalizeH="0" baseline="0" dirty="0">
+                <a:ln>
+                  <a:noFill/>
+                </a:ln>
+                <a:solidFill>
+                  <a:srgbClr val="000000"/>
+                </a:solidFill>
+                <a:effectLst/>
+                <a:latin typeface="Courier New" panose="02070309020205020404" pitchFamily="49" charset="0"/>
+                <a:cs typeface="Courier New" panose="02070309020205020404" pitchFamily="49" charset="0"/>
+              </a:rPr>
+              <a:t>(</a:t>
+            </a:r>
+            <a:r>
+              <a:rPr kumimoji="0" lang="en-US" altLang="en-US" sz="1600" b="1" i="0" u="none" strike="noStrike" cap="none" normalizeH="0" baseline="0" dirty="0">
+                <a:ln>
+                  <a:noFill/>
+                </a:ln>
+                <a:solidFill>
+                  <a:srgbClr val="008000"/>
+                </a:solidFill>
+                <a:effectLst/>
+                <a:latin typeface="Courier New" panose="02070309020205020404" pitchFamily="49" charset="0"/>
+                <a:cs typeface="Courier New" panose="02070309020205020404" pitchFamily="49" charset="0"/>
+              </a:rPr>
+              <a:t>"there is no policy code"</a:t>
+            </a:r>
+            <a:r>
+              <a:rPr kumimoji="0" lang="en-US" altLang="en-US" sz="1600" b="0" i="0" u="none" strike="noStrike" cap="none" normalizeH="0" baseline="0" dirty="0">
+                <a:ln>
+                  <a:noFill/>
+                </a:ln>
+                <a:solidFill>
+                  <a:srgbClr val="000000"/>
+                </a:solidFill>
+                <a:effectLst/>
+                <a:latin typeface="Courier New" panose="02070309020205020404" pitchFamily="49" charset="0"/>
+                <a:cs typeface="Courier New" panose="02070309020205020404" pitchFamily="49" charset="0"/>
+              </a:rPr>
+              <a:t>));</a:t>
+            </a:r>
+            <a:br>
+              <a:rPr kumimoji="0" lang="en-US" altLang="en-US" sz="1600" b="0" i="0" u="none" strike="noStrike" cap="none" normalizeH="0" baseline="0" dirty="0">
+                <a:ln>
+                  <a:noFill/>
+                </a:ln>
+                <a:solidFill>
+                  <a:srgbClr val="000000"/>
+                </a:solidFill>
+                <a:effectLst/>
+                <a:latin typeface="Courier New" panose="02070309020205020404" pitchFamily="49" charset="0"/>
+                <a:cs typeface="Courier New" panose="02070309020205020404" pitchFamily="49" charset="0"/>
+              </a:rPr>
+            </a:br>
+            <a:r>
+              <a:rPr kumimoji="0" lang="en-US" altLang="en-US" sz="1600" b="0" i="0" u="none" strike="noStrike" cap="none" normalizeH="0" baseline="0" dirty="0">
+                <a:ln>
+                  <a:noFill/>
+                </a:ln>
+                <a:solidFill>
+                  <a:srgbClr val="000000"/>
+                </a:solidFill>
+                <a:effectLst/>
+                <a:latin typeface="Courier New" panose="02070309020205020404" pitchFamily="49" charset="0"/>
+                <a:cs typeface="Courier New" panose="02070309020205020404" pitchFamily="49" charset="0"/>
+              </a:rPr>
+              <a:t>}</a:t>
+            </a:r>
+            <a:br>
+              <a:rPr kumimoji="0" lang="en-US" altLang="en-US" sz="1600" b="0" i="0" u="none" strike="noStrike" cap="none" normalizeH="0" baseline="0" dirty="0">
+                <a:ln>
+                  <a:noFill/>
+                </a:ln>
+                <a:solidFill>
+                  <a:srgbClr val="000000"/>
+                </a:solidFill>
+                <a:effectLst/>
+                <a:latin typeface="Courier New" panose="02070309020205020404" pitchFamily="49" charset="0"/>
+                <a:cs typeface="Courier New" panose="02070309020205020404" pitchFamily="49" charset="0"/>
+              </a:rPr>
+            </a:br>
+            <a:endParaRPr kumimoji="0" lang="en-US" altLang="en-US" sz="1600" b="0" i="0" u="none" strike="noStrike" cap="none" normalizeH="0" baseline="0" dirty="0">
+              <a:ln>
+                <a:noFill/>
+              </a:ln>
+              <a:solidFill>
+                <a:schemeClr val="tx1"/>
+              </a:solidFill>
+              <a:effectLst/>
+              <a:latin typeface="Arial" panose="020B0604020202020204" pitchFamily="34" charset="0"/>
+            </a:endParaRPr>
+          </a:p>
+        </p:txBody>
+      </p:sp>
+    </p:spTree>
+    <p:extLst>
+      <p:ext uri="{BB962C8B-B14F-4D97-AF65-F5344CB8AC3E}">
+        <p14:creationId xmlns:p14="http://schemas.microsoft.com/office/powerpoint/2010/main" val="976966028"/>
+      </p:ext>
+    </p:extLst>
+  </p:cSld>
+  <p:clrMapOvr>
+    <a:masterClrMapping/>
+  </p:clrMapOvr>
+</p:sld>
+</file>
+
+<file path=ppt/slides/slide57.xml><?xml version="1.0" encoding="utf-8"?>
 <p:sld xmlns:a="http://schemas.openxmlformats.org/drawingml/2006/main" xmlns:r="http://schemas.openxmlformats.org/officeDocument/2006/relationships" xmlns:p="http://schemas.openxmlformats.org/presentationml/2006/main">
   <p:cSld>
     <p:spTree>
@@ -29301,7 +32156,7 @@
 </p:sld>
 </file>
 
-<file path=ppt/slides/slide55.xml><?xml version="1.0" encoding="utf-8"?>
+<file path=ppt/slides/slide58.xml><?xml version="1.0" encoding="utf-8"?>
 <p:sld xmlns:a="http://schemas.openxmlformats.org/drawingml/2006/main" xmlns:r="http://schemas.openxmlformats.org/officeDocument/2006/relationships" xmlns:p="http://schemas.openxmlformats.org/presentationml/2006/main">
   <p:cSld>
     <p:spTree>

</xml_diff>